<commit_message>
more edits to presentation.
</commit_message>
<xml_diff>
--- a/demo/demo.pptx
+++ b/demo/demo.pptx
@@ -5,7 +5,7 @@
     <p:sldMasterId id="2147483868" r:id="rId1"/>
   </p:sldMasterIdLst>
   <p:notesMasterIdLst>
-    <p:notesMasterId r:id="rId20"/>
+    <p:notesMasterId r:id="rId22"/>
   </p:notesMasterIdLst>
   <p:sldIdLst>
     <p:sldId id="256" r:id="rId2"/>
@@ -24,8 +24,10 @@
     <p:sldId id="274" r:id="rId15"/>
     <p:sldId id="269" r:id="rId16"/>
     <p:sldId id="270" r:id="rId17"/>
-    <p:sldId id="271" r:id="rId18"/>
-    <p:sldId id="257" r:id="rId19"/>
+    <p:sldId id="277" r:id="rId18"/>
+    <p:sldId id="271" r:id="rId19"/>
+    <p:sldId id="276" r:id="rId20"/>
+    <p:sldId id="257" r:id="rId21"/>
   </p:sldIdLst>
   <p:sldSz cx="9144000" cy="6858000" type="screen4x3"/>
   <p:notesSz cx="6858000" cy="9144000"/>
@@ -10919,6 +10921,85 @@
             <p:ph type="title"/>
           </p:nvPr>
         </p:nvSpPr>
+        <p:spPr/>
+        <p:txBody>
+          <a:bodyPr/>
+          <a:lstStyle/>
+          <a:p>
+            <a:r>
+              <a:rPr lang="en-US" sz="9600" dirty="0" smtClean="0"/>
+              <a:t>demo</a:t>
+            </a:r>
+            <a:endParaRPr lang="en-US" sz="9600" dirty="0"/>
+          </a:p>
+        </p:txBody>
+      </p:sp>
+      <p:sp>
+        <p:nvSpPr>
+          <p:cNvPr id="3" name="Text Placeholder 2"/>
+          <p:cNvSpPr>
+            <a:spLocks noGrp="1"/>
+          </p:cNvSpPr>
+          <p:nvPr>
+            <p:ph type="body" idx="1"/>
+          </p:nvPr>
+        </p:nvSpPr>
+        <p:spPr/>
+        <p:txBody>
+          <a:bodyPr/>
+          <a:lstStyle/>
+          <a:p>
+            <a:endParaRPr lang="en-US"/>
+          </a:p>
+        </p:txBody>
+      </p:sp>
+    </p:spTree>
+    <p:extLst>
+      <p:ext uri="{BB962C8B-B14F-4D97-AF65-F5344CB8AC3E}">
+        <p14:creationId xmlns:p14="http://schemas.microsoft.com/office/powerpoint/2010/main" val="921940227"/>
+      </p:ext>
+    </p:extLst>
+  </p:cSld>
+  <p:clrMapOvr>
+    <a:masterClrMapping/>
+  </p:clrMapOvr>
+  <p:timing>
+    <p:tnLst>
+      <p:par>
+        <p:cTn xmlns:p14="http://schemas.microsoft.com/office/powerpoint/2010/main" id="1" dur="indefinite" restart="never" nodeType="tmRoot"/>
+      </p:par>
+    </p:tnLst>
+  </p:timing>
+</p:sld>
+</file>
+
+<file path=ppt/slides/slide18.xml><?xml version="1.0" encoding="utf-8"?>
+<p:sld xmlns:a="http://schemas.openxmlformats.org/drawingml/2006/main" xmlns:r="http://schemas.openxmlformats.org/officeDocument/2006/relationships" xmlns:p="http://schemas.openxmlformats.org/presentationml/2006/main">
+  <p:cSld>
+    <p:spTree>
+      <p:nvGrpSpPr>
+        <p:cNvPr id="1" name=""/>
+        <p:cNvGrpSpPr/>
+        <p:nvPr/>
+      </p:nvGrpSpPr>
+      <p:grpSpPr>
+        <a:xfrm>
+          <a:off x="0" y="0"/>
+          <a:ext cx="0" cy="0"/>
+          <a:chOff x="0" y="0"/>
+          <a:chExt cx="0" cy="0"/>
+        </a:xfrm>
+      </p:grpSpPr>
+      <p:sp>
+        <p:nvSpPr>
+          <p:cNvPr id="2" name="Title 1"/>
+          <p:cNvSpPr>
+            <a:spLocks noGrp="1"/>
+          </p:cNvSpPr>
+          <p:nvPr>
+            <p:ph type="title"/>
+          </p:nvPr>
+        </p:nvSpPr>
         <p:spPr>
           <a:xfrm rot="19140000">
             <a:off x="631242" y="1776157"/>
@@ -10987,7 +11068,332 @@
 </p:sld>
 </file>
 
-<file path=ppt/slides/slide18.xml><?xml version="1.0" encoding="utf-8"?>
+<file path=ppt/slides/slide19.xml><?xml version="1.0" encoding="utf-8"?>
+<p:sld xmlns:a="http://schemas.openxmlformats.org/drawingml/2006/main" xmlns:r="http://schemas.openxmlformats.org/officeDocument/2006/relationships" xmlns:p="http://schemas.openxmlformats.org/presentationml/2006/main">
+  <p:cSld>
+    <p:spTree>
+      <p:nvGrpSpPr>
+        <p:cNvPr id="1" name=""/>
+        <p:cNvGrpSpPr/>
+        <p:nvPr/>
+      </p:nvGrpSpPr>
+      <p:grpSpPr>
+        <a:xfrm>
+          <a:off x="0" y="0"/>
+          <a:ext cx="0" cy="0"/>
+          <a:chOff x="0" y="0"/>
+          <a:chExt cx="0" cy="0"/>
+        </a:xfrm>
+      </p:grpSpPr>
+      <p:sp>
+        <p:nvSpPr>
+          <p:cNvPr id="2" name="Title 1"/>
+          <p:cNvSpPr>
+            <a:spLocks noGrp="1"/>
+          </p:cNvSpPr>
+          <p:nvPr>
+            <p:ph type="title"/>
+          </p:nvPr>
+        </p:nvSpPr>
+        <p:spPr/>
+        <p:txBody>
+          <a:bodyPr/>
+          <a:lstStyle/>
+          <a:p>
+            <a:r>
+              <a:rPr lang="en-US" dirty="0" smtClean="0"/>
+              <a:t>conclusions</a:t>
+            </a:r>
+            <a:endParaRPr lang="en-US" dirty="0"/>
+          </a:p>
+        </p:txBody>
+      </p:sp>
+      <p:sp>
+        <p:nvSpPr>
+          <p:cNvPr id="3" name="TextBox 2"/>
+          <p:cNvSpPr txBox="1"/>
+          <p:nvPr/>
+        </p:nvSpPr>
+        <p:spPr>
+          <a:xfrm>
+            <a:off x="1228632" y="1408185"/>
+            <a:ext cx="6722972" cy="2769989"/>
+          </a:xfrm>
+          <a:prstGeom prst="rect">
+            <a:avLst/>
+          </a:prstGeom>
+          <a:noFill/>
+        </p:spPr>
+        <p:txBody>
+          <a:bodyPr wrap="square" rtlCol="0">
+            <a:spAutoFit/>
+          </a:bodyPr>
+          <a:lstStyle/>
+          <a:p>
+            <a:pPr marL="285750" indent="-285750">
+              <a:spcBef>
+                <a:spcPts val="1200"/>
+              </a:spcBef>
+              <a:buFont typeface="Arial"/>
+              <a:buChar char="•"/>
+            </a:pPr>
+            <a:r>
+              <a:rPr lang="en-US" sz="2400" dirty="0" smtClean="0"/>
+              <a:t>Modularity is key</a:t>
+            </a:r>
+          </a:p>
+          <a:p>
+            <a:pPr marL="285750" indent="-285750">
+              <a:spcBef>
+                <a:spcPts val="1200"/>
+              </a:spcBef>
+              <a:buFont typeface="Arial"/>
+              <a:buChar char="•"/>
+            </a:pPr>
+            <a:r>
+              <a:rPr lang="en-US" sz="2400" dirty="0" smtClean="0"/>
+              <a:t>Expend the effort to reduce development time</a:t>
+            </a:r>
+          </a:p>
+          <a:p>
+            <a:pPr marL="285750" indent="-285750">
+              <a:spcBef>
+                <a:spcPts val="1200"/>
+              </a:spcBef>
+              <a:buFont typeface="Arial"/>
+              <a:buChar char="•"/>
+            </a:pPr>
+            <a:r>
+              <a:rPr lang="en-US" sz="2400" dirty="0" smtClean="0"/>
+              <a:t>Pair down your goals as much as possible in the beginning, allow yourself to not know at every stage how your language will develop.</a:t>
+            </a:r>
+          </a:p>
+          <a:p>
+            <a:pPr marL="285750" indent="-285750">
+              <a:spcBef>
+                <a:spcPts val="1200"/>
+              </a:spcBef>
+              <a:buFont typeface="Arial"/>
+              <a:buChar char="•"/>
+            </a:pPr>
+            <a:r>
+              <a:rPr lang="en-US" sz="2400" dirty="0" smtClean="0"/>
+              <a:t>Work in the same room as your teammates</a:t>
+            </a:r>
+            <a:endParaRPr lang="en-US" sz="2400" dirty="0"/>
+          </a:p>
+        </p:txBody>
+      </p:sp>
+    </p:spTree>
+    <p:extLst>
+      <p:ext uri="{BB962C8B-B14F-4D97-AF65-F5344CB8AC3E}">
+        <p14:creationId xmlns:p14="http://schemas.microsoft.com/office/powerpoint/2010/main" val="3044310269"/>
+      </p:ext>
+    </p:extLst>
+  </p:cSld>
+  <p:clrMapOvr>
+    <a:masterClrMapping/>
+  </p:clrMapOvr>
+  <p:timing>
+    <p:tnLst>
+      <p:par>
+        <p:cTn xmlns:p14="http://schemas.microsoft.com/office/powerpoint/2010/main" id="1" dur="indefinite" restart="never" nodeType="tmRoot"/>
+      </p:par>
+    </p:tnLst>
+  </p:timing>
+</p:sld>
+</file>
+
+<file path=ppt/slides/slide2.xml><?xml version="1.0" encoding="utf-8"?>
+<p:sld xmlns:a="http://schemas.openxmlformats.org/drawingml/2006/main" xmlns:r="http://schemas.openxmlformats.org/officeDocument/2006/relationships" xmlns:p="http://schemas.openxmlformats.org/presentationml/2006/main">
+  <p:cSld>
+    <p:spTree>
+      <p:nvGrpSpPr>
+        <p:cNvPr id="1" name=""/>
+        <p:cNvGrpSpPr/>
+        <p:nvPr/>
+      </p:nvGrpSpPr>
+      <p:grpSpPr>
+        <a:xfrm>
+          <a:off x="0" y="0"/>
+          <a:ext cx="0" cy="0"/>
+          <a:chOff x="0" y="0"/>
+          <a:chExt cx="0" cy="0"/>
+        </a:xfrm>
+      </p:grpSpPr>
+      <p:sp>
+        <p:nvSpPr>
+          <p:cNvPr id="2" name="Title 1"/>
+          <p:cNvSpPr>
+            <a:spLocks noGrp="1"/>
+          </p:cNvSpPr>
+          <p:nvPr>
+            <p:ph type="title"/>
+          </p:nvPr>
+        </p:nvSpPr>
+        <p:spPr/>
+        <p:txBody>
+          <a:bodyPr/>
+          <a:lstStyle/>
+          <a:p>
+            <a:r>
+              <a:rPr lang="en-US" sz="6000" dirty="0" smtClean="0"/>
+              <a:t>outline</a:t>
+            </a:r>
+            <a:endParaRPr lang="en-US" sz="6000" dirty="0"/>
+          </a:p>
+        </p:txBody>
+      </p:sp>
+      <p:sp>
+        <p:nvSpPr>
+          <p:cNvPr id="3" name="Content Placeholder 2"/>
+          <p:cNvSpPr>
+            <a:spLocks noGrp="1"/>
+          </p:cNvSpPr>
+          <p:nvPr>
+            <p:ph idx="1"/>
+          </p:nvPr>
+        </p:nvSpPr>
+        <p:spPr>
+          <a:xfrm>
+            <a:off x="4682590" y="3458274"/>
+            <a:ext cx="3807779" cy="3324687"/>
+          </a:xfrm>
+        </p:spPr>
+        <p:txBody>
+          <a:bodyPr>
+            <a:noAutofit/>
+          </a:bodyPr>
+          <a:lstStyle/>
+          <a:p>
+            <a:pPr>
+              <a:buFont typeface="+mj-lt"/>
+              <a:buAutoNum type="arabicPeriod"/>
+            </a:pPr>
+            <a:r>
+              <a:rPr lang="en-US" sz="2000" dirty="0"/>
+              <a:t>Introduction (Sam)</a:t>
+            </a:r>
+          </a:p>
+          <a:p>
+            <a:pPr>
+              <a:buFont typeface="+mj-lt"/>
+              <a:buAutoNum type="arabicPeriod"/>
+            </a:pPr>
+            <a:r>
+              <a:rPr lang="en-US" sz="2000" dirty="0"/>
+              <a:t>Syntax (Paul)</a:t>
+            </a:r>
+          </a:p>
+          <a:p>
+            <a:pPr>
+              <a:buFont typeface="+mj-lt"/>
+              <a:buAutoNum type="arabicPeriod"/>
+            </a:pPr>
+            <a:r>
+              <a:rPr lang="en-US" sz="2000" dirty="0"/>
+              <a:t>Compiler Architecture (Ben)</a:t>
+            </a:r>
+          </a:p>
+          <a:p>
+            <a:pPr>
+              <a:buFont typeface="+mj-lt"/>
+              <a:buAutoNum type="arabicPeriod"/>
+            </a:pPr>
+            <a:r>
+              <a:rPr lang="en-US" sz="2000" dirty="0"/>
+              <a:t>Runtime Environment (</a:t>
+            </a:r>
+            <a:r>
+              <a:rPr lang="en-US" sz="2000" dirty="0" err="1"/>
+              <a:t>Kurry</a:t>
+            </a:r>
+            <a:r>
+              <a:rPr lang="en-US" sz="2000" dirty="0"/>
+              <a:t>)</a:t>
+            </a:r>
+          </a:p>
+          <a:p>
+            <a:pPr>
+              <a:buFont typeface="+mj-lt"/>
+              <a:buAutoNum type="arabicPeriod"/>
+            </a:pPr>
+            <a:r>
+              <a:rPr lang="en-US" sz="2000" dirty="0"/>
+              <a:t>Testing (Jason</a:t>
+            </a:r>
+            <a:r>
+              <a:rPr lang="en-US" sz="2000" dirty="0" smtClean="0"/>
+              <a:t>)</a:t>
+            </a:r>
+          </a:p>
+          <a:p>
+            <a:pPr>
+              <a:buFont typeface="+mj-lt"/>
+              <a:buAutoNum type="arabicPeriod"/>
+            </a:pPr>
+            <a:r>
+              <a:rPr lang="en-US" sz="2000" dirty="0" smtClean="0"/>
+              <a:t>Demo</a:t>
+            </a:r>
+            <a:endParaRPr lang="en-US" sz="2000" dirty="0"/>
+          </a:p>
+          <a:p>
+            <a:pPr>
+              <a:buFont typeface="+mj-lt"/>
+              <a:buAutoNum type="arabicPeriod"/>
+            </a:pPr>
+            <a:r>
+              <a:rPr lang="en-US" sz="2000" dirty="0" smtClean="0"/>
+              <a:t>Conclusions</a:t>
+            </a:r>
+            <a:endParaRPr lang="en-US" sz="2000" dirty="0"/>
+          </a:p>
+          <a:p>
+            <a:endParaRPr lang="en-US" sz="2000" dirty="0"/>
+          </a:p>
+        </p:txBody>
+      </p:sp>
+      <p:sp>
+        <p:nvSpPr>
+          <p:cNvPr id="4" name="Text Placeholder 3"/>
+          <p:cNvSpPr>
+            <a:spLocks noGrp="1"/>
+          </p:cNvSpPr>
+          <p:nvPr>
+            <p:ph type="body" sz="half" idx="2"/>
+          </p:nvPr>
+        </p:nvSpPr>
+        <p:spPr/>
+        <p:txBody>
+          <a:bodyPr/>
+          <a:lstStyle/>
+          <a:p>
+            <a:endParaRPr lang="en-US" dirty="0"/>
+          </a:p>
+        </p:txBody>
+      </p:sp>
+    </p:spTree>
+    <p:extLst>
+      <p:ext uri="{BB962C8B-B14F-4D97-AF65-F5344CB8AC3E}">
+        <p14:creationId xmlns:p14="http://schemas.microsoft.com/office/powerpoint/2010/main" val="842254260"/>
+      </p:ext>
+    </p:extLst>
+  </p:cSld>
+  <p:clrMapOvr>
+    <a:masterClrMapping/>
+  </p:clrMapOvr>
+  <p:timing>
+    <p:tnLst>
+      <p:par>
+        <p:cTn xmlns:p14="http://schemas.microsoft.com/office/powerpoint/2010/main" id="1" dur="indefinite" restart="never" nodeType="tmRoot"/>
+      </p:par>
+    </p:tnLst>
+  </p:timing>
+</p:sld>
+</file>
+
+<file path=ppt/slides/slide20.xml><?xml version="1.0" encoding="utf-8"?>
 <p:sld xmlns:a="http://schemas.openxmlformats.org/drawingml/2006/main" xmlns:r="http://schemas.openxmlformats.org/officeDocument/2006/relationships" xmlns:p="http://schemas.openxmlformats.org/presentationml/2006/main">
   <p:cSld>
     <p:spTree>
@@ -11097,180 +11503,6 @@
     <p:extLst>
       <p:ext uri="{BB962C8B-B14F-4D97-AF65-F5344CB8AC3E}">
         <p14:creationId xmlns:p14="http://schemas.microsoft.com/office/powerpoint/2010/main" val="2597203885"/>
-      </p:ext>
-    </p:extLst>
-  </p:cSld>
-  <p:clrMapOvr>
-    <a:masterClrMapping/>
-  </p:clrMapOvr>
-  <p:timing>
-    <p:tnLst>
-      <p:par>
-        <p:cTn xmlns:p14="http://schemas.microsoft.com/office/powerpoint/2010/main" id="1" dur="indefinite" restart="never" nodeType="tmRoot"/>
-      </p:par>
-    </p:tnLst>
-  </p:timing>
-</p:sld>
-</file>
-
-<file path=ppt/slides/slide2.xml><?xml version="1.0" encoding="utf-8"?>
-<p:sld xmlns:a="http://schemas.openxmlformats.org/drawingml/2006/main" xmlns:r="http://schemas.openxmlformats.org/officeDocument/2006/relationships" xmlns:p="http://schemas.openxmlformats.org/presentationml/2006/main">
-  <p:cSld>
-    <p:spTree>
-      <p:nvGrpSpPr>
-        <p:cNvPr id="1" name=""/>
-        <p:cNvGrpSpPr/>
-        <p:nvPr/>
-      </p:nvGrpSpPr>
-      <p:grpSpPr>
-        <a:xfrm>
-          <a:off x="0" y="0"/>
-          <a:ext cx="0" cy="0"/>
-          <a:chOff x="0" y="0"/>
-          <a:chExt cx="0" cy="0"/>
-        </a:xfrm>
-      </p:grpSpPr>
-      <p:sp>
-        <p:nvSpPr>
-          <p:cNvPr id="2" name="Title 1"/>
-          <p:cNvSpPr>
-            <a:spLocks noGrp="1"/>
-          </p:cNvSpPr>
-          <p:nvPr>
-            <p:ph type="title"/>
-          </p:nvPr>
-        </p:nvSpPr>
-        <p:spPr/>
-        <p:txBody>
-          <a:bodyPr/>
-          <a:lstStyle/>
-          <a:p>
-            <a:r>
-              <a:rPr lang="en-US" sz="6000" dirty="0" smtClean="0"/>
-              <a:t>outline</a:t>
-            </a:r>
-            <a:endParaRPr lang="en-US" sz="6000" dirty="0"/>
-          </a:p>
-        </p:txBody>
-      </p:sp>
-      <p:sp>
-        <p:nvSpPr>
-          <p:cNvPr id="3" name="Content Placeholder 2"/>
-          <p:cNvSpPr>
-            <a:spLocks noGrp="1"/>
-          </p:cNvSpPr>
-          <p:nvPr>
-            <p:ph idx="1"/>
-          </p:nvPr>
-        </p:nvSpPr>
-        <p:spPr>
-          <a:xfrm>
-            <a:off x="4682590" y="3458274"/>
-            <a:ext cx="3807779" cy="3324687"/>
-          </a:xfrm>
-        </p:spPr>
-        <p:txBody>
-          <a:bodyPr>
-            <a:noAutofit/>
-          </a:bodyPr>
-          <a:lstStyle/>
-          <a:p>
-            <a:pPr>
-              <a:buFont typeface="+mj-lt"/>
-              <a:buAutoNum type="arabicPeriod"/>
-            </a:pPr>
-            <a:r>
-              <a:rPr lang="en-US" sz="2000" dirty="0"/>
-              <a:t>Introduction (Sam)</a:t>
-            </a:r>
-          </a:p>
-          <a:p>
-            <a:pPr>
-              <a:buFont typeface="+mj-lt"/>
-              <a:buAutoNum type="arabicPeriod"/>
-            </a:pPr>
-            <a:r>
-              <a:rPr lang="en-US" sz="2000" dirty="0"/>
-              <a:t>Syntax (Paul)</a:t>
-            </a:r>
-          </a:p>
-          <a:p>
-            <a:pPr>
-              <a:buFont typeface="+mj-lt"/>
-              <a:buAutoNum type="arabicPeriod"/>
-            </a:pPr>
-            <a:r>
-              <a:rPr lang="en-US" sz="2000" dirty="0"/>
-              <a:t>Compiler Architecture (Ben)</a:t>
-            </a:r>
-          </a:p>
-          <a:p>
-            <a:pPr>
-              <a:buFont typeface="+mj-lt"/>
-              <a:buAutoNum type="arabicPeriod"/>
-            </a:pPr>
-            <a:r>
-              <a:rPr lang="en-US" sz="2000" dirty="0"/>
-              <a:t>Runtime Environment (</a:t>
-            </a:r>
-            <a:r>
-              <a:rPr lang="en-US" sz="2000" dirty="0" err="1"/>
-              <a:t>Kurry</a:t>
-            </a:r>
-            <a:r>
-              <a:rPr lang="en-US" sz="2000" dirty="0"/>
-              <a:t>)</a:t>
-            </a:r>
-          </a:p>
-          <a:p>
-            <a:pPr>
-              <a:buFont typeface="+mj-lt"/>
-              <a:buAutoNum type="arabicPeriod"/>
-            </a:pPr>
-            <a:r>
-              <a:rPr lang="en-US" sz="2000" dirty="0"/>
-              <a:t>Testing (Jason)</a:t>
-            </a:r>
-          </a:p>
-          <a:p>
-            <a:pPr>
-              <a:buFont typeface="+mj-lt"/>
-              <a:buAutoNum type="arabicPeriod"/>
-            </a:pPr>
-            <a:r>
-              <a:rPr lang="en-US" sz="2000" dirty="0" smtClean="0"/>
-              <a:t>Conclusions</a:t>
-            </a:r>
-            <a:endParaRPr lang="en-US" sz="2000" dirty="0"/>
-          </a:p>
-          <a:p>
-            <a:endParaRPr lang="en-US" sz="2000" dirty="0"/>
-          </a:p>
-        </p:txBody>
-      </p:sp>
-      <p:sp>
-        <p:nvSpPr>
-          <p:cNvPr id="4" name="Text Placeholder 3"/>
-          <p:cNvSpPr>
-            <a:spLocks noGrp="1"/>
-          </p:cNvSpPr>
-          <p:nvPr>
-            <p:ph type="body" sz="half" idx="2"/>
-          </p:nvPr>
-        </p:nvSpPr>
-        <p:spPr/>
-        <p:txBody>
-          <a:bodyPr/>
-          <a:lstStyle/>
-          <a:p>
-            <a:endParaRPr lang="en-US" dirty="0"/>
-          </a:p>
-        </p:txBody>
-      </p:sp>
-    </p:spTree>
-    <p:extLst>
-      <p:ext uri="{BB962C8B-B14F-4D97-AF65-F5344CB8AC3E}">
-        <p14:creationId xmlns:p14="http://schemas.microsoft.com/office/powerpoint/2010/main" val="842254260"/>
       </p:ext>
     </p:extLst>
   </p:cSld>

</xml_diff>

<commit_message>
adding to paul's slides.
</commit_message>
<xml_diff>
--- a/demo/demo.pptx
+++ b/demo/demo.pptx
@@ -5,7 +5,7 @@
     <p:sldMasterId id="2147483868" r:id="rId1"/>
   </p:sldMasterIdLst>
   <p:notesMasterIdLst>
-    <p:notesMasterId r:id="rId23"/>
+    <p:notesMasterId r:id="rId25"/>
   </p:notesMasterIdLst>
   <p:sldIdLst>
     <p:sldId id="256" r:id="rId2"/>
@@ -19,16 +19,18 @@
     <p:sldId id="259" r:id="rId10"/>
     <p:sldId id="263" r:id="rId11"/>
     <p:sldId id="264" r:id="rId12"/>
-    <p:sldId id="258" r:id="rId13"/>
-    <p:sldId id="268" r:id="rId14"/>
-    <p:sldId id="273" r:id="rId15"/>
-    <p:sldId id="274" r:id="rId16"/>
-    <p:sldId id="269" r:id="rId17"/>
-    <p:sldId id="270" r:id="rId18"/>
-    <p:sldId id="277" r:id="rId19"/>
-    <p:sldId id="271" r:id="rId20"/>
-    <p:sldId id="276" r:id="rId21"/>
-    <p:sldId id="257" r:id="rId22"/>
+    <p:sldId id="280" r:id="rId13"/>
+    <p:sldId id="281" r:id="rId14"/>
+    <p:sldId id="258" r:id="rId15"/>
+    <p:sldId id="268" r:id="rId16"/>
+    <p:sldId id="273" r:id="rId17"/>
+    <p:sldId id="274" r:id="rId18"/>
+    <p:sldId id="269" r:id="rId19"/>
+    <p:sldId id="270" r:id="rId20"/>
+    <p:sldId id="277" r:id="rId21"/>
+    <p:sldId id="271" r:id="rId22"/>
+    <p:sldId id="276" r:id="rId23"/>
+    <p:sldId id="257" r:id="rId24"/>
   </p:sldIdLst>
   <p:sldSz cx="9144000" cy="6858000" type="screen4x3"/>
   <p:notesSz cx="6858000" cy="9144000"/>
@@ -545,7 +547,7 @@
           <a:p>
             <a:fld id="{42BEFFAC-3482-42C7-A3E5-AAF6C77BD00F}" type="slidenum">
               <a:rPr lang="en-US" smtClean="0"/>
-              <a:t>15</a:t>
+              <a:t>17</a:t>
             </a:fld>
             <a:endParaRPr lang="en-US"/>
           </a:p>
@@ -6418,11 +6420,15 @@
           <a:p>
             <a:r>
               <a:rPr lang="en-US" dirty="0" smtClean="0"/>
-              <a:t>The simplest </a:t>
+              <a:t>User-defined functions (@F</a:t>
+            </a:r>
+            <a:r>
+              <a:rPr lang="en-US" cap="none" dirty="0" smtClean="0"/>
+              <a:t>unctions</a:t>
             </a:r>
             <a:r>
               <a:rPr lang="en-US" dirty="0" smtClean="0"/>
-              <a:t>distributed sort</a:t>
+              <a:t>)</a:t>
             </a:r>
             <a:endParaRPr lang="en-US" dirty="0"/>
           </a:p>
@@ -6440,318 +6446,260 @@
         </p:nvSpPr>
         <p:spPr>
           <a:xfrm>
-            <a:off x="1525405" y="1152473"/>
-            <a:ext cx="6201388" cy="3205025"/>
+            <a:off x="2217252" y="1100628"/>
+            <a:ext cx="4698988" cy="3579849"/>
           </a:xfrm>
         </p:spPr>
         <p:txBody>
           <a:bodyPr>
-            <a:noAutofit/>
+            <a:normAutofit/>
           </a:bodyPr>
           <a:lstStyle/>
           <a:p>
-            <a:pPr marL="0" indent="0">
+            <a:pPr>
               <a:spcBef>
                 <a:spcPts val="600"/>
               </a:spcBef>
             </a:pPr>
             <a:r>
-              <a:rPr lang="en-US" sz="1400" dirty="0" smtClean="0">
-                <a:latin typeface="Lucida Console"/>
-                <a:cs typeface="Lucida Console"/>
-              </a:rPr>
-              <a:t>0  @</a:t>
-            </a:r>
-            <a:r>
-              <a:rPr lang="en-US" sz="1400" dirty="0">
-                <a:latin typeface="Lucida Console"/>
-                <a:cs typeface="Lucida Console"/>
-              </a:rPr>
-              <a:t>Map (</a:t>
-            </a:r>
-            <a:r>
-              <a:rPr lang="en-US" sz="1400" dirty="0" err="1">
-                <a:latin typeface="Lucida Console"/>
-                <a:cs typeface="Lucida Console"/>
-              </a:rPr>
-              <a:t>int</a:t>
-            </a:r>
-            <a:r>
-              <a:rPr lang="en-US" sz="1400" dirty="0">
-                <a:latin typeface="Lucida Console"/>
-                <a:cs typeface="Lucida Console"/>
-              </a:rPr>
-              <a:t> </a:t>
-            </a:r>
-            <a:r>
-              <a:rPr lang="en-US" sz="1400" dirty="0" err="1">
-                <a:latin typeface="Lucida Console"/>
-                <a:cs typeface="Lucida Console"/>
-              </a:rPr>
-              <a:t>lineNum</a:t>
-            </a:r>
-            <a:r>
-              <a:rPr lang="en-US" sz="1400" dirty="0">
-                <a:latin typeface="Lucida Console"/>
-                <a:cs typeface="Lucida Console"/>
-              </a:rPr>
-              <a:t>, text line) -&gt; (text, text) {</a:t>
-            </a:r>
-          </a:p>
-          <a:p>
-            <a:pPr marL="0" indent="0">
+              <a:rPr lang="en-US" dirty="0" smtClean="0">
+                <a:latin typeface="Lucida Console"/>
+                <a:cs typeface="Lucida Console"/>
+              </a:rPr>
+              <a:t>0   @</a:t>
+            </a:r>
+            <a:r>
+              <a:rPr lang="en-US" dirty="0">
+                <a:latin typeface="Lucida Console"/>
+                <a:cs typeface="Lucida Console"/>
+              </a:rPr>
+              <a:t>Functions {</a:t>
+            </a:r>
+          </a:p>
+          <a:p>
+            <a:pPr>
               <a:spcBef>
                 <a:spcPts val="600"/>
               </a:spcBef>
             </a:pPr>
             <a:r>
-              <a:rPr lang="en-US" sz="1400" dirty="0" smtClean="0">
-                <a:latin typeface="Lucida Console"/>
-                <a:cs typeface="Lucida Console"/>
-              </a:rPr>
-              <a:t>1    </a:t>
-            </a:r>
-            <a:r>
-              <a:rPr lang="en-US" sz="1400" dirty="0" err="1" smtClean="0">
-                <a:latin typeface="Lucida Console"/>
-                <a:cs typeface="Lucida Console"/>
-              </a:rPr>
-              <a:t>foreach</a:t>
-            </a:r>
-            <a:r>
-              <a:rPr lang="en-US" sz="1400" dirty="0" smtClean="0">
+              <a:rPr lang="en-US" dirty="0" smtClean="0">
+                <a:latin typeface="Lucida Console"/>
+                <a:cs typeface="Lucida Console"/>
+              </a:rPr>
+              <a:t>1   </a:t>
+            </a:r>
+            <a:r>
+              <a:rPr lang="en-US" dirty="0" err="1" smtClean="0">
+                <a:latin typeface="Lucida Console"/>
+                <a:cs typeface="Lucida Console"/>
+              </a:rPr>
+              <a:t>int</a:t>
+            </a:r>
+            <a:r>
+              <a:rPr lang="en-US" dirty="0" smtClean="0">
                 <a:latin typeface="Lucida Console"/>
                 <a:cs typeface="Lucida Console"/>
               </a:rPr>
               <a:t> </a:t>
             </a:r>
             <a:r>
-              <a:rPr lang="en-US" sz="1400" dirty="0">
-                <a:latin typeface="Lucida Console"/>
-                <a:cs typeface="Lucida Console"/>
-              </a:rPr>
-              <a:t>text number in </a:t>
-            </a:r>
-            <a:r>
-              <a:rPr lang="en-US" sz="1400" dirty="0" err="1">
-                <a:latin typeface="Lucida Console"/>
-                <a:cs typeface="Lucida Console"/>
-              </a:rPr>
-              <a:t>line.tokenize</a:t>
-            </a:r>
-            <a:r>
-              <a:rPr lang="en-US" sz="1400" dirty="0">
-                <a:latin typeface="Lucida Console"/>
-                <a:cs typeface="Lucida Console"/>
-              </a:rPr>
-              <a:t>(" ") {</a:t>
-            </a:r>
-          </a:p>
-          <a:p>
-            <a:pPr marL="0" indent="0">
+              <a:rPr lang="en-US" dirty="0">
+                <a:latin typeface="Lucida Console"/>
+                <a:cs typeface="Lucida Console"/>
+              </a:rPr>
+              <a:t>fib(</a:t>
+            </a:r>
+            <a:r>
+              <a:rPr lang="en-US" dirty="0" err="1">
+                <a:latin typeface="Lucida Console"/>
+                <a:cs typeface="Lucida Console"/>
+              </a:rPr>
+              <a:t>int</a:t>
+            </a:r>
+            <a:r>
+              <a:rPr lang="en-US" dirty="0">
+                <a:latin typeface="Lucida Console"/>
+                <a:cs typeface="Lucida Console"/>
+              </a:rPr>
+              <a:t> n) {</a:t>
+            </a:r>
+          </a:p>
+          <a:p>
+            <a:pPr>
               <a:spcBef>
                 <a:spcPts val="600"/>
               </a:spcBef>
             </a:pPr>
             <a:r>
-              <a:rPr lang="en-US" sz="1400" dirty="0" smtClean="0">
-                <a:latin typeface="Lucida Console"/>
-                <a:cs typeface="Lucida Console"/>
-              </a:rPr>
-              <a:t>2      emit</a:t>
-            </a:r>
-            <a:r>
-              <a:rPr lang="en-US" sz="1400" dirty="0">
-                <a:latin typeface="Lucida Console"/>
-                <a:cs typeface="Lucida Console"/>
-              </a:rPr>
-              <a:t>(number, number);</a:t>
-            </a:r>
-          </a:p>
-          <a:p>
-            <a:pPr marL="0" indent="0">
+              <a:rPr lang="en-US" dirty="0" smtClean="0">
+                <a:latin typeface="Lucida Console"/>
+                <a:cs typeface="Lucida Console"/>
+              </a:rPr>
+              <a:t>2     </a:t>
+            </a:r>
+            <a:r>
+              <a:rPr lang="en-US" dirty="0">
+                <a:latin typeface="Lucida Console"/>
+                <a:cs typeface="Lucida Console"/>
+              </a:rPr>
+              <a:t>if (n == 0) {</a:t>
+            </a:r>
+          </a:p>
+          <a:p>
+            <a:pPr>
               <a:spcBef>
                 <a:spcPts val="600"/>
               </a:spcBef>
             </a:pPr>
             <a:r>
-              <a:rPr lang="en-US" sz="1400" dirty="0" smtClean="0">
-                <a:latin typeface="Lucida Console"/>
-                <a:cs typeface="Lucida Console"/>
-              </a:rPr>
-              <a:t>3    }</a:t>
-            </a:r>
-            <a:endParaRPr lang="en-US" sz="1400" dirty="0">
-              <a:latin typeface="Lucida Console"/>
-              <a:cs typeface="Lucida Console"/>
-            </a:endParaRPr>
-          </a:p>
-          <a:p>
-            <a:pPr marL="0" indent="0">
+              <a:rPr lang="en-US" dirty="0" smtClean="0">
+                <a:latin typeface="Lucida Console"/>
+                <a:cs typeface="Lucida Console"/>
+              </a:rPr>
+              <a:t>3       </a:t>
+            </a:r>
+            <a:r>
+              <a:rPr lang="en-US" dirty="0">
+                <a:latin typeface="Lucida Console"/>
+                <a:cs typeface="Lucida Console"/>
+              </a:rPr>
+              <a:t>return 1;</a:t>
+            </a:r>
+          </a:p>
+          <a:p>
+            <a:pPr>
               <a:spcBef>
                 <a:spcPts val="600"/>
               </a:spcBef>
             </a:pPr>
             <a:r>
-              <a:rPr lang="en-US" sz="1400" dirty="0" smtClean="0">
-                <a:latin typeface="Lucida Console"/>
-                <a:cs typeface="Lucida Console"/>
-              </a:rPr>
-              <a:t>4  }</a:t>
-            </a:r>
-            <a:endParaRPr lang="en-US" sz="1400" dirty="0">
-              <a:latin typeface="Lucida Console"/>
-              <a:cs typeface="Lucida Console"/>
-            </a:endParaRPr>
-          </a:p>
-          <a:p>
-            <a:pPr marL="0" indent="0">
+              <a:rPr lang="en-US" dirty="0" smtClean="0">
+                <a:latin typeface="Lucida Console"/>
+                <a:cs typeface="Lucida Console"/>
+              </a:rPr>
+              <a:t>4     </a:t>
+            </a:r>
+            <a:r>
+              <a:rPr lang="en-US" dirty="0">
+                <a:latin typeface="Lucida Console"/>
+                <a:cs typeface="Lucida Console"/>
+              </a:rPr>
+              <a:t>} </a:t>
+            </a:r>
+            <a:r>
+              <a:rPr lang="en-US" dirty="0" err="1">
+                <a:latin typeface="Lucida Console"/>
+                <a:cs typeface="Lucida Console"/>
+              </a:rPr>
+              <a:t>elseif</a:t>
+            </a:r>
+            <a:r>
+              <a:rPr lang="en-US" dirty="0">
+                <a:latin typeface="Lucida Console"/>
+                <a:cs typeface="Lucida Console"/>
+              </a:rPr>
+              <a:t> (n == 1) {</a:t>
+            </a:r>
+          </a:p>
+          <a:p>
+            <a:pPr>
               <a:spcBef>
                 <a:spcPts val="600"/>
               </a:spcBef>
             </a:pPr>
-            <a:endParaRPr lang="en-US" sz="1400" dirty="0">
-              <a:latin typeface="Lucida Console"/>
-              <a:cs typeface="Lucida Console"/>
-            </a:endParaRPr>
-          </a:p>
-          <a:p>
-            <a:pPr marL="0" indent="0">
+            <a:r>
+              <a:rPr lang="en-US" dirty="0" smtClean="0">
+                <a:latin typeface="Lucida Console"/>
+                <a:cs typeface="Lucida Console"/>
+              </a:rPr>
+              <a:t>5       </a:t>
+            </a:r>
+            <a:r>
+              <a:rPr lang="en-US" dirty="0">
+                <a:latin typeface="Lucida Console"/>
+                <a:cs typeface="Lucida Console"/>
+              </a:rPr>
+              <a:t>return 1;</a:t>
+            </a:r>
+          </a:p>
+          <a:p>
+            <a:pPr>
               <a:spcBef>
                 <a:spcPts val="600"/>
               </a:spcBef>
             </a:pPr>
             <a:r>
-              <a:rPr lang="en-US" sz="1400" dirty="0" smtClean="0">
-                <a:latin typeface="Lucida Console"/>
-                <a:cs typeface="Lucida Console"/>
-              </a:rPr>
-              <a:t>5  @</a:t>
-            </a:r>
-            <a:r>
-              <a:rPr lang="en-US" sz="1400" dirty="0">
-                <a:latin typeface="Lucida Console"/>
-                <a:cs typeface="Lucida Console"/>
-              </a:rPr>
-              <a:t>Reduce (text number, text garbage) -&gt; (text, text) {</a:t>
-            </a:r>
-          </a:p>
-          <a:p>
-            <a:pPr marL="0" indent="0">
+              <a:rPr lang="en-US" dirty="0" smtClean="0">
+                <a:latin typeface="Lucida Console"/>
+                <a:cs typeface="Lucida Console"/>
+              </a:rPr>
+              <a:t>6     </a:t>
+            </a:r>
+            <a:r>
+              <a:rPr lang="en-US" dirty="0">
+                <a:latin typeface="Lucida Console"/>
+                <a:cs typeface="Lucida Console"/>
+              </a:rPr>
+              <a:t>} else {</a:t>
+            </a:r>
+          </a:p>
+          <a:p>
+            <a:pPr>
               <a:spcBef>
                 <a:spcPts val="600"/>
               </a:spcBef>
             </a:pPr>
             <a:r>
-              <a:rPr lang="en-US" sz="1400" dirty="0" smtClean="0">
-                <a:latin typeface="Lucida Console"/>
-                <a:cs typeface="Lucida Console"/>
-              </a:rPr>
-              <a:t>6    </a:t>
-            </a:r>
-            <a:r>
-              <a:rPr lang="en-US" sz="1400" dirty="0">
-                <a:latin typeface="Lucida Console"/>
-                <a:cs typeface="Lucida Console"/>
-              </a:rPr>
-              <a:t>emit(number, "");</a:t>
-            </a:r>
-          </a:p>
-          <a:p>
-            <a:pPr marL="0" indent="0">
+              <a:rPr lang="en-US" dirty="0" smtClean="0">
+                <a:latin typeface="Lucida Console"/>
+                <a:cs typeface="Lucida Console"/>
+              </a:rPr>
+              <a:t>7       </a:t>
+            </a:r>
+            <a:r>
+              <a:rPr lang="en-US" dirty="0">
+                <a:latin typeface="Lucida Console"/>
+                <a:cs typeface="Lucida Console"/>
+              </a:rPr>
+              <a:t>return fib(n-1) + fib(n-2);</a:t>
+            </a:r>
+          </a:p>
+          <a:p>
+            <a:pPr>
               <a:spcBef>
                 <a:spcPts val="600"/>
               </a:spcBef>
             </a:pPr>
             <a:r>
-              <a:rPr lang="en-US" sz="1400" dirty="0" smtClean="0">
-                <a:latin typeface="Lucida Console"/>
-                <a:cs typeface="Lucida Console"/>
-              </a:rPr>
-              <a:t>7  }</a:t>
-            </a:r>
-            <a:endParaRPr lang="en-US" sz="1400" dirty="0">
-              <a:latin typeface="Lucida Console"/>
-              <a:cs typeface="Lucida Console"/>
-            </a:endParaRPr>
-          </a:p>
-          <a:p>
-            <a:pPr marL="0" indent="0">
+              <a:rPr lang="en-US" dirty="0" smtClean="0">
+                <a:latin typeface="Lucida Console"/>
+                <a:cs typeface="Lucida Console"/>
+              </a:rPr>
+              <a:t>8     </a:t>
+            </a:r>
+            <a:r>
+              <a:rPr lang="en-US" dirty="0">
+                <a:latin typeface="Lucida Console"/>
+                <a:cs typeface="Lucida Console"/>
+              </a:rPr>
+              <a:t>}</a:t>
+            </a:r>
+          </a:p>
+          <a:p>
+            <a:pPr>
               <a:spcBef>
                 <a:spcPts val="600"/>
               </a:spcBef>
             </a:pPr>
             <a:r>
-              <a:rPr lang="en-US" sz="1400" dirty="0">
-                <a:latin typeface="Lucida Console"/>
-                <a:cs typeface="Lucida Console"/>
-              </a:rPr>
-              <a:t>    </a:t>
-            </a:r>
-          </a:p>
-          <a:p>
-            <a:pPr marL="0" indent="0">
-              <a:spcBef>
-                <a:spcPts val="600"/>
-              </a:spcBef>
-            </a:pPr>
-            <a:r>
-              <a:rPr lang="en-US" sz="1400" dirty="0" smtClean="0">
-                <a:latin typeface="Lucida Console"/>
-                <a:cs typeface="Lucida Console"/>
-              </a:rPr>
-              <a:t>8  @</a:t>
-            </a:r>
-            <a:r>
-              <a:rPr lang="en-US" sz="1400" dirty="0">
-                <a:latin typeface="Lucida Console"/>
-                <a:cs typeface="Lucida Console"/>
-              </a:rPr>
-              <a:t>Main {</a:t>
-            </a:r>
-          </a:p>
-          <a:p>
-            <a:pPr marL="0" indent="0">
-              <a:spcBef>
-                <a:spcPts val="600"/>
-              </a:spcBef>
-            </a:pPr>
-            <a:r>
-              <a:rPr lang="en-US" sz="1400" dirty="0" smtClean="0">
-                <a:latin typeface="Lucida Console"/>
-                <a:cs typeface="Lucida Console"/>
-              </a:rPr>
-              <a:t>9    </a:t>
-            </a:r>
-            <a:r>
-              <a:rPr lang="en-US" sz="1400" dirty="0" err="1">
-                <a:latin typeface="Lucida Console"/>
-                <a:cs typeface="Lucida Console"/>
-              </a:rPr>
-              <a:t>mapReduce</a:t>
-            </a:r>
-            <a:r>
-              <a:rPr lang="en-US" sz="1400" dirty="0">
-                <a:latin typeface="Lucida Console"/>
-                <a:cs typeface="Lucida Console"/>
-              </a:rPr>
-              <a:t>();</a:t>
-            </a:r>
-          </a:p>
-          <a:p>
-            <a:pPr marL="0" indent="0">
-              <a:spcBef>
-                <a:spcPts val="600"/>
-              </a:spcBef>
-            </a:pPr>
-            <a:r>
-              <a:rPr lang="en-US" sz="1400" dirty="0" smtClean="0">
-                <a:latin typeface="Lucida Console"/>
-                <a:cs typeface="Lucida Console"/>
-              </a:rPr>
-              <a:t>10 }</a:t>
-            </a:r>
-            <a:endParaRPr lang="en-US" sz="1400" dirty="0">
+              <a:rPr lang="en-US" dirty="0" smtClean="0">
+                <a:latin typeface="Lucida Console"/>
+                <a:cs typeface="Lucida Console"/>
+              </a:rPr>
+              <a:t>9   }</a:t>
+            </a:r>
+            <a:endParaRPr lang="en-US" dirty="0">
               <a:latin typeface="Lucida Console"/>
               <a:cs typeface="Lucida Console"/>
             </a:endParaRPr>
@@ -6761,7 +6709,7 @@
     </p:spTree>
     <p:extLst>
       <p:ext uri="{BB962C8B-B14F-4D97-AF65-F5344CB8AC3E}">
-        <p14:creationId xmlns:p14="http://schemas.microsoft.com/office/powerpoint/2010/main" val="2487640545"/>
+        <p14:creationId xmlns:p14="http://schemas.microsoft.com/office/powerpoint/2010/main" val="4050177092"/>
       </p:ext>
     </p:extLst>
   </p:cSld>
@@ -6805,6 +6753,814 @@
             <p:ph type="title"/>
           </p:nvPr>
         </p:nvSpPr>
+        <p:spPr/>
+        <p:txBody>
+          <a:bodyPr/>
+          <a:lstStyle/>
+          <a:p>
+            <a:r>
+              <a:rPr lang="en-US" dirty="0"/>
+              <a:t>User-defined functions (@F</a:t>
+            </a:r>
+            <a:r>
+              <a:rPr lang="en-US" cap="none" dirty="0"/>
+              <a:t>unctions</a:t>
+            </a:r>
+            <a:r>
+              <a:rPr lang="en-US" dirty="0"/>
+              <a:t>)</a:t>
+            </a:r>
+          </a:p>
+        </p:txBody>
+      </p:sp>
+      <p:sp>
+        <p:nvSpPr>
+          <p:cNvPr id="3" name="Content Placeholder 2"/>
+          <p:cNvSpPr>
+            <a:spLocks noGrp="1"/>
+          </p:cNvSpPr>
+          <p:nvPr>
+            <p:ph idx="1"/>
+          </p:nvPr>
+        </p:nvSpPr>
+        <p:spPr>
+          <a:xfrm>
+            <a:off x="1168082" y="1266297"/>
+            <a:ext cx="6866352" cy="3579849"/>
+          </a:xfrm>
+        </p:spPr>
+        <p:txBody>
+          <a:bodyPr/>
+          <a:lstStyle/>
+          <a:p>
+            <a:r>
+              <a:rPr lang="en-US" dirty="0" smtClean="0">
+                <a:latin typeface="Lucida Console"/>
+                <a:cs typeface="Lucida Console"/>
+              </a:rPr>
+              <a:t>10 list</a:t>
+            </a:r>
+            <a:r>
+              <a:rPr lang="en-US" dirty="0">
+                <a:latin typeface="Lucida Console"/>
+                <a:cs typeface="Lucida Console"/>
+              </a:rPr>
+              <a:t>&lt;</a:t>
+            </a:r>
+            <a:r>
+              <a:rPr lang="en-US" dirty="0" err="1">
+                <a:latin typeface="Lucida Console"/>
+                <a:cs typeface="Lucida Console"/>
+              </a:rPr>
+              <a:t>int</a:t>
+            </a:r>
+            <a:r>
+              <a:rPr lang="en-US" dirty="0">
+                <a:latin typeface="Lucida Console"/>
+                <a:cs typeface="Lucida Console"/>
+              </a:rPr>
+              <a:t>&gt; </a:t>
+            </a:r>
+            <a:r>
+              <a:rPr lang="en-US" dirty="0" err="1">
+                <a:latin typeface="Lucida Console"/>
+                <a:cs typeface="Lucida Console"/>
+              </a:rPr>
+              <a:t>reverseList</a:t>
+            </a:r>
+            <a:r>
+              <a:rPr lang="en-US" dirty="0">
+                <a:latin typeface="Lucida Console"/>
+                <a:cs typeface="Lucida Console"/>
+              </a:rPr>
+              <a:t>(list&lt;</a:t>
+            </a:r>
+            <a:r>
+              <a:rPr lang="en-US" dirty="0" err="1">
+                <a:latin typeface="Lucida Console"/>
+                <a:cs typeface="Lucida Console"/>
+              </a:rPr>
+              <a:t>int</a:t>
+            </a:r>
+            <a:r>
+              <a:rPr lang="en-US" dirty="0">
+                <a:latin typeface="Lucida Console"/>
+                <a:cs typeface="Lucida Console"/>
+              </a:rPr>
+              <a:t>&gt; </a:t>
+            </a:r>
+            <a:r>
+              <a:rPr lang="en-US" dirty="0" err="1">
+                <a:latin typeface="Lucida Console"/>
+                <a:cs typeface="Lucida Console"/>
+              </a:rPr>
+              <a:t>oldList</a:t>
+            </a:r>
+            <a:r>
+              <a:rPr lang="en-US" dirty="0">
+                <a:latin typeface="Lucida Console"/>
+                <a:cs typeface="Lucida Console"/>
+              </a:rPr>
+              <a:t>) {</a:t>
+            </a:r>
+          </a:p>
+          <a:p>
+            <a:r>
+              <a:rPr lang="en-US" dirty="0" smtClean="0">
+                <a:latin typeface="Lucida Console"/>
+                <a:cs typeface="Lucida Console"/>
+              </a:rPr>
+              <a:t>11   list</a:t>
+            </a:r>
+            <a:r>
+              <a:rPr lang="en-US" dirty="0">
+                <a:latin typeface="Lucida Console"/>
+                <a:cs typeface="Lucida Console"/>
+              </a:rPr>
+              <a:t>&lt;</a:t>
+            </a:r>
+            <a:r>
+              <a:rPr lang="en-US" dirty="0" err="1">
+                <a:latin typeface="Lucida Console"/>
+                <a:cs typeface="Lucida Console"/>
+              </a:rPr>
+              <a:t>int</a:t>
+            </a:r>
+            <a:r>
+              <a:rPr lang="en-US" dirty="0">
+                <a:latin typeface="Lucida Console"/>
+                <a:cs typeface="Lucida Console"/>
+              </a:rPr>
+              <a:t>&gt; </a:t>
+            </a:r>
+            <a:r>
+              <a:rPr lang="en-US" dirty="0" err="1">
+                <a:latin typeface="Lucida Console"/>
+                <a:cs typeface="Lucida Console"/>
+              </a:rPr>
+              <a:t>newList</a:t>
+            </a:r>
+            <a:r>
+              <a:rPr lang="en-US" dirty="0">
+                <a:latin typeface="Lucida Console"/>
+                <a:cs typeface="Lucida Console"/>
+              </a:rPr>
+              <a:t>;</a:t>
+            </a:r>
+          </a:p>
+          <a:p>
+            <a:r>
+              <a:rPr lang="en-US" dirty="0" smtClean="0">
+                <a:latin typeface="Lucida Console"/>
+                <a:cs typeface="Lucida Console"/>
+              </a:rPr>
+              <a:t>12   for </a:t>
+            </a:r>
+            <a:r>
+              <a:rPr lang="en-US" dirty="0">
+                <a:latin typeface="Lucida Console"/>
+                <a:cs typeface="Lucida Console"/>
+              </a:rPr>
+              <a:t>(</a:t>
+            </a:r>
+            <a:r>
+              <a:rPr lang="en-US" dirty="0" err="1">
+                <a:latin typeface="Lucida Console"/>
+                <a:cs typeface="Lucida Console"/>
+              </a:rPr>
+              <a:t>int</a:t>
+            </a:r>
+            <a:r>
+              <a:rPr lang="en-US" dirty="0">
+                <a:latin typeface="Lucida Console"/>
+                <a:cs typeface="Lucida Console"/>
+              </a:rPr>
+              <a:t> </a:t>
+            </a:r>
+            <a:r>
+              <a:rPr lang="en-US" dirty="0" err="1">
+                <a:latin typeface="Lucida Console"/>
+                <a:cs typeface="Lucida Console"/>
+              </a:rPr>
+              <a:t>i</a:t>
+            </a:r>
+            <a:r>
+              <a:rPr lang="en-US" dirty="0">
+                <a:latin typeface="Lucida Console"/>
+                <a:cs typeface="Lucida Console"/>
+              </a:rPr>
+              <a:t> = </a:t>
+            </a:r>
+            <a:r>
+              <a:rPr lang="en-US" dirty="0" err="1">
+                <a:latin typeface="Lucida Console"/>
+                <a:cs typeface="Lucida Console"/>
+              </a:rPr>
+              <a:t>oldList.size</a:t>
+            </a:r>
+            <a:r>
+              <a:rPr lang="en-US" dirty="0">
+                <a:latin typeface="Lucida Console"/>
+                <a:cs typeface="Lucida Console"/>
+              </a:rPr>
+              <a:t>() - 1; </a:t>
+            </a:r>
+            <a:r>
+              <a:rPr lang="en-US" dirty="0" err="1">
+                <a:latin typeface="Lucida Console"/>
+                <a:cs typeface="Lucida Console"/>
+              </a:rPr>
+              <a:t>i</a:t>
+            </a:r>
+            <a:r>
+              <a:rPr lang="en-US" dirty="0">
+                <a:latin typeface="Lucida Console"/>
+                <a:cs typeface="Lucida Console"/>
+              </a:rPr>
+              <a:t> &gt;= 0; </a:t>
+            </a:r>
+            <a:r>
+              <a:rPr lang="en-US" dirty="0" err="1">
+                <a:latin typeface="Lucida Console"/>
+                <a:cs typeface="Lucida Console"/>
+              </a:rPr>
+              <a:t>i</a:t>
+            </a:r>
+            <a:r>
+              <a:rPr lang="en-US" dirty="0">
+                <a:latin typeface="Lucida Console"/>
+                <a:cs typeface="Lucida Console"/>
+              </a:rPr>
+              <a:t>--;) {</a:t>
+            </a:r>
+          </a:p>
+          <a:p>
+            <a:r>
+              <a:rPr lang="en-US" dirty="0" smtClean="0">
+                <a:latin typeface="Lucida Console"/>
+                <a:cs typeface="Lucida Console"/>
+              </a:rPr>
+              <a:t>13     </a:t>
+            </a:r>
+            <a:r>
+              <a:rPr lang="en-US" dirty="0" err="1" smtClean="0">
+                <a:latin typeface="Lucida Console"/>
+                <a:cs typeface="Lucida Console"/>
+              </a:rPr>
+              <a:t>newList.add</a:t>
+            </a:r>
+            <a:r>
+              <a:rPr lang="en-US" dirty="0">
+                <a:latin typeface="Lucida Console"/>
+                <a:cs typeface="Lucida Console"/>
+              </a:rPr>
+              <a:t>(</a:t>
+            </a:r>
+            <a:r>
+              <a:rPr lang="en-US" dirty="0" err="1">
+                <a:latin typeface="Lucida Console"/>
+                <a:cs typeface="Lucida Console"/>
+              </a:rPr>
+              <a:t>oldList.get</a:t>
+            </a:r>
+            <a:r>
+              <a:rPr lang="en-US" dirty="0">
+                <a:latin typeface="Lucida Console"/>
+                <a:cs typeface="Lucida Console"/>
+              </a:rPr>
+              <a:t>(</a:t>
+            </a:r>
+            <a:r>
+              <a:rPr lang="en-US" dirty="0" err="1">
+                <a:latin typeface="Lucida Console"/>
+                <a:cs typeface="Lucida Console"/>
+              </a:rPr>
+              <a:t>i</a:t>
+            </a:r>
+            <a:r>
+              <a:rPr lang="en-US" dirty="0">
+                <a:latin typeface="Lucida Console"/>
+                <a:cs typeface="Lucida Console"/>
+              </a:rPr>
+              <a:t>))</a:t>
+            </a:r>
+            <a:r>
+              <a:rPr lang="en-US" dirty="0" smtClean="0">
+                <a:latin typeface="Lucida Console"/>
+                <a:cs typeface="Lucida Console"/>
+              </a:rPr>
+              <a:t>;</a:t>
+            </a:r>
+            <a:endParaRPr lang="en-US" dirty="0">
+              <a:latin typeface="Lucida Console"/>
+              <a:cs typeface="Lucida Console"/>
+            </a:endParaRPr>
+          </a:p>
+          <a:p>
+            <a:r>
+              <a:rPr lang="en-US" dirty="0" smtClean="0">
+                <a:latin typeface="Lucida Console"/>
+                <a:cs typeface="Lucida Console"/>
+              </a:rPr>
+              <a:t>14   }</a:t>
+            </a:r>
+            <a:endParaRPr lang="en-US" dirty="0">
+              <a:latin typeface="Lucida Console"/>
+              <a:cs typeface="Lucida Console"/>
+            </a:endParaRPr>
+          </a:p>
+          <a:p>
+            <a:r>
+              <a:rPr lang="en-US" dirty="0" smtClean="0">
+                <a:latin typeface="Lucida Console"/>
+                <a:cs typeface="Lucida Console"/>
+              </a:rPr>
+              <a:t>15   return </a:t>
+            </a:r>
+            <a:r>
+              <a:rPr lang="en-US" dirty="0" err="1">
+                <a:latin typeface="Lucida Console"/>
+                <a:cs typeface="Lucida Console"/>
+              </a:rPr>
+              <a:t>newList</a:t>
+            </a:r>
+            <a:r>
+              <a:rPr lang="en-US" dirty="0">
+                <a:latin typeface="Lucida Console"/>
+                <a:cs typeface="Lucida Console"/>
+              </a:rPr>
+              <a:t>;</a:t>
+            </a:r>
+          </a:p>
+          <a:p>
+            <a:r>
+              <a:rPr lang="en-US" dirty="0" smtClean="0">
+                <a:latin typeface="Lucida Console"/>
+                <a:cs typeface="Lucida Console"/>
+              </a:rPr>
+              <a:t>16 } </a:t>
+            </a:r>
+            <a:r>
+              <a:rPr lang="en-US" i="1" dirty="0" smtClean="0">
+                <a:solidFill>
+                  <a:srgbClr val="797B7E"/>
+                </a:solidFill>
+                <a:latin typeface="Lucida Console"/>
+                <a:cs typeface="Lucida Console"/>
+              </a:rPr>
+              <a:t># end of functions</a:t>
+            </a:r>
+            <a:endParaRPr lang="en-US" i="1" dirty="0">
+              <a:solidFill>
+                <a:srgbClr val="797B7E"/>
+              </a:solidFill>
+              <a:latin typeface="Lucida Console"/>
+              <a:cs typeface="Lucida Console"/>
+            </a:endParaRPr>
+          </a:p>
+        </p:txBody>
+      </p:sp>
+    </p:spTree>
+    <p:extLst>
+      <p:ext uri="{BB962C8B-B14F-4D97-AF65-F5344CB8AC3E}">
+        <p14:creationId xmlns:p14="http://schemas.microsoft.com/office/powerpoint/2010/main" val="3764539858"/>
+      </p:ext>
+    </p:extLst>
+  </p:cSld>
+  <p:clrMapOvr>
+    <a:masterClrMapping/>
+  </p:clrMapOvr>
+  <p:timing>
+    <p:tnLst>
+      <p:par>
+        <p:cTn xmlns:p14="http://schemas.microsoft.com/office/powerpoint/2010/main" id="1" dur="indefinite" restart="never" nodeType="tmRoot"/>
+      </p:par>
+    </p:tnLst>
+  </p:timing>
+</p:sld>
+</file>
+
+<file path=ppt/slides/slide14.xml><?xml version="1.0" encoding="utf-8"?>
+<p:sld xmlns:a="http://schemas.openxmlformats.org/drawingml/2006/main" xmlns:r="http://schemas.openxmlformats.org/officeDocument/2006/relationships" xmlns:p="http://schemas.openxmlformats.org/presentationml/2006/main">
+  <p:cSld>
+    <p:spTree>
+      <p:nvGrpSpPr>
+        <p:cNvPr id="1" name=""/>
+        <p:cNvGrpSpPr/>
+        <p:nvPr/>
+      </p:nvGrpSpPr>
+      <p:grpSpPr>
+        <a:xfrm>
+          <a:off x="0" y="0"/>
+          <a:ext cx="0" cy="0"/>
+          <a:chOff x="0" y="0"/>
+          <a:chExt cx="0" cy="0"/>
+        </a:xfrm>
+      </p:grpSpPr>
+      <p:sp>
+        <p:nvSpPr>
+          <p:cNvPr id="2" name="Title 1"/>
+          <p:cNvSpPr>
+            <a:spLocks noGrp="1"/>
+          </p:cNvSpPr>
+          <p:nvPr>
+            <p:ph type="title"/>
+          </p:nvPr>
+        </p:nvSpPr>
+        <p:spPr/>
+        <p:txBody>
+          <a:bodyPr/>
+          <a:lstStyle/>
+          <a:p>
+            <a:r>
+              <a:rPr lang="en-US" dirty="0" smtClean="0"/>
+              <a:t>The simplest </a:t>
+            </a:r>
+            <a:r>
+              <a:rPr lang="en-US" dirty="0" smtClean="0"/>
+              <a:t>distributed sort</a:t>
+            </a:r>
+            <a:endParaRPr lang="en-US" dirty="0"/>
+          </a:p>
+        </p:txBody>
+      </p:sp>
+      <p:sp>
+        <p:nvSpPr>
+          <p:cNvPr id="3" name="Content Placeholder 2"/>
+          <p:cNvSpPr>
+            <a:spLocks noGrp="1"/>
+          </p:cNvSpPr>
+          <p:nvPr>
+            <p:ph idx="1"/>
+          </p:nvPr>
+        </p:nvSpPr>
+        <p:spPr>
+          <a:xfrm>
+            <a:off x="1525405" y="1152473"/>
+            <a:ext cx="6201388" cy="3205025"/>
+          </a:xfrm>
+        </p:spPr>
+        <p:txBody>
+          <a:bodyPr>
+            <a:noAutofit/>
+          </a:bodyPr>
+          <a:lstStyle/>
+          <a:p>
+            <a:pPr marL="0" indent="0">
+              <a:spcBef>
+                <a:spcPts val="600"/>
+              </a:spcBef>
+            </a:pPr>
+            <a:r>
+              <a:rPr lang="en-US" sz="1400" dirty="0" smtClean="0">
+                <a:latin typeface="Lucida Console"/>
+                <a:cs typeface="Lucida Console"/>
+              </a:rPr>
+              <a:t>0  @</a:t>
+            </a:r>
+            <a:r>
+              <a:rPr lang="en-US" sz="1400" dirty="0">
+                <a:latin typeface="Lucida Console"/>
+                <a:cs typeface="Lucida Console"/>
+              </a:rPr>
+              <a:t>Map (</a:t>
+            </a:r>
+            <a:r>
+              <a:rPr lang="en-US" sz="1400" dirty="0" err="1">
+                <a:latin typeface="Lucida Console"/>
+                <a:cs typeface="Lucida Console"/>
+              </a:rPr>
+              <a:t>int</a:t>
+            </a:r>
+            <a:r>
+              <a:rPr lang="en-US" sz="1400" dirty="0">
+                <a:latin typeface="Lucida Console"/>
+                <a:cs typeface="Lucida Console"/>
+              </a:rPr>
+              <a:t> </a:t>
+            </a:r>
+            <a:r>
+              <a:rPr lang="en-US" sz="1400" dirty="0" err="1">
+                <a:latin typeface="Lucida Console"/>
+                <a:cs typeface="Lucida Console"/>
+              </a:rPr>
+              <a:t>lineNum</a:t>
+            </a:r>
+            <a:r>
+              <a:rPr lang="en-US" sz="1400" dirty="0">
+                <a:latin typeface="Lucida Console"/>
+                <a:cs typeface="Lucida Console"/>
+              </a:rPr>
+              <a:t>, text line) -&gt; (text, text) {</a:t>
+            </a:r>
+          </a:p>
+          <a:p>
+            <a:pPr marL="0" indent="0">
+              <a:spcBef>
+                <a:spcPts val="600"/>
+              </a:spcBef>
+            </a:pPr>
+            <a:r>
+              <a:rPr lang="en-US" sz="1400" dirty="0" smtClean="0">
+                <a:latin typeface="Lucida Console"/>
+                <a:cs typeface="Lucida Console"/>
+              </a:rPr>
+              <a:t>1    </a:t>
+            </a:r>
+            <a:r>
+              <a:rPr lang="en-US" sz="1400" dirty="0" err="1" smtClean="0">
+                <a:latin typeface="Lucida Console"/>
+                <a:cs typeface="Lucida Console"/>
+              </a:rPr>
+              <a:t>foreach</a:t>
+            </a:r>
+            <a:r>
+              <a:rPr lang="en-US" sz="1400" dirty="0" smtClean="0">
+                <a:latin typeface="Lucida Console"/>
+                <a:cs typeface="Lucida Console"/>
+              </a:rPr>
+              <a:t> </a:t>
+            </a:r>
+            <a:r>
+              <a:rPr lang="en-US" sz="1400" dirty="0">
+                <a:latin typeface="Lucida Console"/>
+                <a:cs typeface="Lucida Console"/>
+              </a:rPr>
+              <a:t>text number in </a:t>
+            </a:r>
+            <a:r>
+              <a:rPr lang="en-US" sz="1400" dirty="0" err="1">
+                <a:latin typeface="Lucida Console"/>
+                <a:cs typeface="Lucida Console"/>
+              </a:rPr>
+              <a:t>line.tokenize</a:t>
+            </a:r>
+            <a:r>
+              <a:rPr lang="en-US" sz="1400" dirty="0">
+                <a:latin typeface="Lucida Console"/>
+                <a:cs typeface="Lucida Console"/>
+              </a:rPr>
+              <a:t>(" ") {</a:t>
+            </a:r>
+          </a:p>
+          <a:p>
+            <a:pPr marL="0" indent="0">
+              <a:spcBef>
+                <a:spcPts val="600"/>
+              </a:spcBef>
+            </a:pPr>
+            <a:r>
+              <a:rPr lang="en-US" sz="1400" dirty="0" smtClean="0">
+                <a:latin typeface="Lucida Console"/>
+                <a:cs typeface="Lucida Console"/>
+              </a:rPr>
+              <a:t>2      emit</a:t>
+            </a:r>
+            <a:r>
+              <a:rPr lang="en-US" sz="1400" dirty="0">
+                <a:latin typeface="Lucida Console"/>
+                <a:cs typeface="Lucida Console"/>
+              </a:rPr>
+              <a:t>(number, number);</a:t>
+            </a:r>
+          </a:p>
+          <a:p>
+            <a:pPr marL="0" indent="0">
+              <a:spcBef>
+                <a:spcPts val="600"/>
+              </a:spcBef>
+            </a:pPr>
+            <a:r>
+              <a:rPr lang="en-US" sz="1400" dirty="0" smtClean="0">
+                <a:latin typeface="Lucida Console"/>
+                <a:cs typeface="Lucida Console"/>
+              </a:rPr>
+              <a:t>3    }</a:t>
+            </a:r>
+            <a:endParaRPr lang="en-US" sz="1400" dirty="0">
+              <a:latin typeface="Lucida Console"/>
+              <a:cs typeface="Lucida Console"/>
+            </a:endParaRPr>
+          </a:p>
+          <a:p>
+            <a:pPr marL="0" indent="0">
+              <a:spcBef>
+                <a:spcPts val="600"/>
+              </a:spcBef>
+            </a:pPr>
+            <a:r>
+              <a:rPr lang="en-US" sz="1400" dirty="0" smtClean="0">
+                <a:latin typeface="Lucida Console"/>
+                <a:cs typeface="Lucida Console"/>
+              </a:rPr>
+              <a:t>4  }</a:t>
+            </a:r>
+            <a:endParaRPr lang="en-US" sz="1400" dirty="0">
+              <a:latin typeface="Lucida Console"/>
+              <a:cs typeface="Lucida Console"/>
+            </a:endParaRPr>
+          </a:p>
+          <a:p>
+            <a:pPr marL="0" indent="0">
+              <a:spcBef>
+                <a:spcPts val="600"/>
+              </a:spcBef>
+            </a:pPr>
+            <a:endParaRPr lang="en-US" sz="1400" dirty="0">
+              <a:latin typeface="Lucida Console"/>
+              <a:cs typeface="Lucida Console"/>
+            </a:endParaRPr>
+          </a:p>
+          <a:p>
+            <a:pPr marL="0" indent="0">
+              <a:spcBef>
+                <a:spcPts val="600"/>
+              </a:spcBef>
+            </a:pPr>
+            <a:r>
+              <a:rPr lang="en-US" sz="1400" dirty="0" smtClean="0">
+                <a:latin typeface="Lucida Console"/>
+                <a:cs typeface="Lucida Console"/>
+              </a:rPr>
+              <a:t>5  @</a:t>
+            </a:r>
+            <a:r>
+              <a:rPr lang="en-US" sz="1400" dirty="0">
+                <a:latin typeface="Lucida Console"/>
+                <a:cs typeface="Lucida Console"/>
+              </a:rPr>
+              <a:t>Reduce (text number, text garbage) -&gt; (text, text) {</a:t>
+            </a:r>
+          </a:p>
+          <a:p>
+            <a:pPr marL="0" indent="0">
+              <a:spcBef>
+                <a:spcPts val="600"/>
+              </a:spcBef>
+            </a:pPr>
+            <a:r>
+              <a:rPr lang="en-US" sz="1400" dirty="0" smtClean="0">
+                <a:latin typeface="Lucida Console"/>
+                <a:cs typeface="Lucida Console"/>
+              </a:rPr>
+              <a:t>6    </a:t>
+            </a:r>
+            <a:r>
+              <a:rPr lang="en-US" sz="1400" dirty="0">
+                <a:latin typeface="Lucida Console"/>
+                <a:cs typeface="Lucida Console"/>
+              </a:rPr>
+              <a:t>emit(number, "");</a:t>
+            </a:r>
+          </a:p>
+          <a:p>
+            <a:pPr marL="0" indent="0">
+              <a:spcBef>
+                <a:spcPts val="600"/>
+              </a:spcBef>
+            </a:pPr>
+            <a:r>
+              <a:rPr lang="en-US" sz="1400" dirty="0" smtClean="0">
+                <a:latin typeface="Lucida Console"/>
+                <a:cs typeface="Lucida Console"/>
+              </a:rPr>
+              <a:t>7  }</a:t>
+            </a:r>
+            <a:endParaRPr lang="en-US" sz="1400" dirty="0">
+              <a:latin typeface="Lucida Console"/>
+              <a:cs typeface="Lucida Console"/>
+            </a:endParaRPr>
+          </a:p>
+          <a:p>
+            <a:pPr marL="0" indent="0">
+              <a:spcBef>
+                <a:spcPts val="600"/>
+              </a:spcBef>
+            </a:pPr>
+            <a:r>
+              <a:rPr lang="en-US" sz="1400" dirty="0">
+                <a:latin typeface="Lucida Console"/>
+                <a:cs typeface="Lucida Console"/>
+              </a:rPr>
+              <a:t>    </a:t>
+            </a:r>
+          </a:p>
+          <a:p>
+            <a:pPr marL="0" indent="0">
+              <a:spcBef>
+                <a:spcPts val="600"/>
+              </a:spcBef>
+            </a:pPr>
+            <a:r>
+              <a:rPr lang="en-US" sz="1400" dirty="0" smtClean="0">
+                <a:latin typeface="Lucida Console"/>
+                <a:cs typeface="Lucida Console"/>
+              </a:rPr>
+              <a:t>8  @</a:t>
+            </a:r>
+            <a:r>
+              <a:rPr lang="en-US" sz="1400" dirty="0">
+                <a:latin typeface="Lucida Console"/>
+                <a:cs typeface="Lucida Console"/>
+              </a:rPr>
+              <a:t>Main {</a:t>
+            </a:r>
+          </a:p>
+          <a:p>
+            <a:pPr marL="0" indent="0">
+              <a:spcBef>
+                <a:spcPts val="600"/>
+              </a:spcBef>
+            </a:pPr>
+            <a:r>
+              <a:rPr lang="en-US" sz="1400" dirty="0" smtClean="0">
+                <a:latin typeface="Lucida Console"/>
+                <a:cs typeface="Lucida Console"/>
+              </a:rPr>
+              <a:t>9    </a:t>
+            </a:r>
+            <a:r>
+              <a:rPr lang="en-US" sz="1400" dirty="0" err="1">
+                <a:latin typeface="Lucida Console"/>
+                <a:cs typeface="Lucida Console"/>
+              </a:rPr>
+              <a:t>mapReduce</a:t>
+            </a:r>
+            <a:r>
+              <a:rPr lang="en-US" sz="1400" dirty="0">
+                <a:latin typeface="Lucida Console"/>
+                <a:cs typeface="Lucida Console"/>
+              </a:rPr>
+              <a:t>();</a:t>
+            </a:r>
+          </a:p>
+          <a:p>
+            <a:pPr marL="0" indent="0">
+              <a:spcBef>
+                <a:spcPts val="600"/>
+              </a:spcBef>
+            </a:pPr>
+            <a:r>
+              <a:rPr lang="en-US" sz="1400" dirty="0" smtClean="0">
+                <a:latin typeface="Lucida Console"/>
+                <a:cs typeface="Lucida Console"/>
+              </a:rPr>
+              <a:t>10 }</a:t>
+            </a:r>
+            <a:endParaRPr lang="en-US" sz="1400" dirty="0">
+              <a:latin typeface="Lucida Console"/>
+              <a:cs typeface="Lucida Console"/>
+            </a:endParaRPr>
+          </a:p>
+        </p:txBody>
+      </p:sp>
+    </p:spTree>
+    <p:extLst>
+      <p:ext uri="{BB962C8B-B14F-4D97-AF65-F5344CB8AC3E}">
+        <p14:creationId xmlns:p14="http://schemas.microsoft.com/office/powerpoint/2010/main" val="2487640545"/>
+      </p:ext>
+    </p:extLst>
+  </p:cSld>
+  <p:clrMapOvr>
+    <a:masterClrMapping/>
+  </p:clrMapOvr>
+  <p:timing>
+    <p:tnLst>
+      <p:par>
+        <p:cTn xmlns:p14="http://schemas.microsoft.com/office/powerpoint/2010/main" id="1" dur="indefinite" restart="never" nodeType="tmRoot"/>
+      </p:par>
+    </p:tnLst>
+  </p:timing>
+</p:sld>
+</file>
+
+<file path=ppt/slides/slide15.xml><?xml version="1.0" encoding="utf-8"?>
+<p:sld xmlns:a="http://schemas.openxmlformats.org/drawingml/2006/main" xmlns:r="http://schemas.openxmlformats.org/officeDocument/2006/relationships" xmlns:p="http://schemas.openxmlformats.org/presentationml/2006/main">
+  <p:cSld>
+    <p:spTree>
+      <p:nvGrpSpPr>
+        <p:cNvPr id="1" name=""/>
+        <p:cNvGrpSpPr/>
+        <p:nvPr/>
+      </p:nvGrpSpPr>
+      <p:grpSpPr>
+        <a:xfrm>
+          <a:off x="0" y="0"/>
+          <a:ext cx="0" cy="0"/>
+          <a:chOff x="0" y="0"/>
+          <a:chExt cx="0" cy="0"/>
+        </a:xfrm>
+      </p:grpSpPr>
+      <p:sp>
+        <p:nvSpPr>
+          <p:cNvPr id="2" name="Title 1"/>
+          <p:cNvSpPr>
+            <a:spLocks noGrp="1"/>
+          </p:cNvSpPr>
+          <p:nvPr>
+            <p:ph type="title"/>
+          </p:nvPr>
+        </p:nvSpPr>
         <p:spPr>
           <a:xfrm rot="19140000">
             <a:off x="631242" y="1776157"/>
@@ -6881,7 +7637,7 @@
 </p:sld>
 </file>
 
-<file path=ppt/slides/slide14.xml><?xml version="1.0" encoding="utf-8"?>
+<file path=ppt/slides/slide16.xml><?xml version="1.0" encoding="utf-8"?>
 <p:sld xmlns:a="http://schemas.openxmlformats.org/drawingml/2006/main" xmlns:r="http://schemas.openxmlformats.org/officeDocument/2006/relationships" xmlns:p="http://schemas.openxmlformats.org/presentationml/2006/main">
   <p:cSld>
     <p:spTree>
@@ -10013,7 +10769,7 @@
 </p:sld>
 </file>
 
-<file path=ppt/slides/slide15.xml><?xml version="1.0" encoding="utf-8"?>
+<file path=ppt/slides/slide17.xml><?xml version="1.0" encoding="utf-8"?>
 <p:sld xmlns:a="http://schemas.openxmlformats.org/drawingml/2006/main" xmlns:r="http://schemas.openxmlformats.org/officeDocument/2006/relationships" xmlns:p="http://schemas.openxmlformats.org/presentationml/2006/main">
   <p:cSld>
     <p:spTree>
@@ -11079,7 +11835,7 @@
 </p:sld>
 </file>
 
-<file path=ppt/slides/slide16.xml><?xml version="1.0" encoding="utf-8"?>
+<file path=ppt/slides/slide18.xml><?xml version="1.0" encoding="utf-8"?>
 <p:sld xmlns:a="http://schemas.openxmlformats.org/drawingml/2006/main" xmlns:r="http://schemas.openxmlformats.org/officeDocument/2006/relationships" xmlns:p="http://schemas.openxmlformats.org/presentationml/2006/main">
   <p:cSld>
     <p:spTree>
@@ -11170,188 +11926,6 @@
     <p:extLst>
       <p:ext uri="{BB962C8B-B14F-4D97-AF65-F5344CB8AC3E}">
         <p14:creationId xmlns:p14="http://schemas.microsoft.com/office/powerpoint/2010/main" val="720806030"/>
-      </p:ext>
-    </p:extLst>
-  </p:cSld>
-  <p:clrMapOvr>
-    <a:masterClrMapping/>
-  </p:clrMapOvr>
-  <p:timing>
-    <p:tnLst>
-      <p:par>
-        <p:cTn xmlns:p14="http://schemas.microsoft.com/office/powerpoint/2010/main" id="1" dur="indefinite" restart="never" nodeType="tmRoot"/>
-      </p:par>
-    </p:tnLst>
-  </p:timing>
-</p:sld>
-</file>
-
-<file path=ppt/slides/slide17.xml><?xml version="1.0" encoding="utf-8"?>
-<p:sld xmlns:a="http://schemas.openxmlformats.org/drawingml/2006/main" xmlns:r="http://schemas.openxmlformats.org/officeDocument/2006/relationships" xmlns:p="http://schemas.openxmlformats.org/presentationml/2006/main">
-  <p:cSld>
-    <p:spTree>
-      <p:nvGrpSpPr>
-        <p:cNvPr id="1" name=""/>
-        <p:cNvGrpSpPr/>
-        <p:nvPr/>
-      </p:nvGrpSpPr>
-      <p:grpSpPr>
-        <a:xfrm>
-          <a:off x="0" y="0"/>
-          <a:ext cx="0" cy="0"/>
-          <a:chOff x="0" y="0"/>
-          <a:chExt cx="0" cy="0"/>
-        </a:xfrm>
-      </p:grpSpPr>
-      <p:sp>
-        <p:nvSpPr>
-          <p:cNvPr id="2" name="Title 1"/>
-          <p:cNvSpPr>
-            <a:spLocks noGrp="1"/>
-          </p:cNvSpPr>
-          <p:nvPr>
-            <p:ph type="title"/>
-          </p:nvPr>
-        </p:nvSpPr>
-        <p:spPr>
-          <a:xfrm rot="19140000">
-            <a:off x="631242" y="1776157"/>
-            <a:ext cx="5650992" cy="1207509"/>
-          </a:xfrm>
-        </p:spPr>
-        <p:txBody>
-          <a:bodyPr/>
-          <a:lstStyle/>
-          <a:p>
-            <a:r>
-              <a:rPr lang="en-US" sz="6000" dirty="0" smtClean="0"/>
-              <a:t>Testing</a:t>
-            </a:r>
-            <a:endParaRPr lang="en-US" sz="6000" dirty="0"/>
-          </a:p>
-        </p:txBody>
-      </p:sp>
-      <p:sp>
-        <p:nvSpPr>
-          <p:cNvPr id="3" name="Text Placeholder 2"/>
-          <p:cNvSpPr>
-            <a:spLocks noGrp="1"/>
-          </p:cNvSpPr>
-          <p:nvPr>
-            <p:ph type="body" idx="1"/>
-          </p:nvPr>
-        </p:nvSpPr>
-        <p:spPr>
-          <a:xfrm rot="19140000">
-            <a:off x="938448" y="2278221"/>
-            <a:ext cx="7240656" cy="329184"/>
-          </a:xfrm>
-        </p:spPr>
-        <p:txBody>
-          <a:bodyPr>
-            <a:noAutofit/>
-          </a:bodyPr>
-          <a:lstStyle/>
-          <a:p>
-            <a:r>
-              <a:rPr lang="en-US" sz="2400" spc="0" dirty="0" smtClean="0"/>
-              <a:t>Jason </a:t>
-            </a:r>
-            <a:r>
-              <a:rPr lang="en-US" sz="2400" spc="0" dirty="0" err="1" smtClean="0"/>
-              <a:t>halpern</a:t>
-            </a:r>
-            <a:r>
-              <a:rPr lang="en-US" sz="2400" spc="0" dirty="0" smtClean="0"/>
-              <a:t> (testing/validation)</a:t>
-            </a:r>
-            <a:endParaRPr lang="en-US" sz="2400" spc="0" dirty="0"/>
-          </a:p>
-        </p:txBody>
-      </p:sp>
-    </p:spTree>
-    <p:extLst>
-      <p:ext uri="{BB962C8B-B14F-4D97-AF65-F5344CB8AC3E}">
-        <p14:creationId xmlns:p14="http://schemas.microsoft.com/office/powerpoint/2010/main" val="720806030"/>
-      </p:ext>
-    </p:extLst>
-  </p:cSld>
-  <p:clrMapOvr>
-    <a:masterClrMapping/>
-  </p:clrMapOvr>
-  <p:timing>
-    <p:tnLst>
-      <p:par>
-        <p:cTn xmlns:p14="http://schemas.microsoft.com/office/powerpoint/2010/main" id="1" dur="indefinite" restart="never" nodeType="tmRoot"/>
-      </p:par>
-    </p:tnLst>
-  </p:timing>
-</p:sld>
-</file>
-
-<file path=ppt/slides/slide18.xml><?xml version="1.0" encoding="utf-8"?>
-<p:sld xmlns:a="http://schemas.openxmlformats.org/drawingml/2006/main" xmlns:r="http://schemas.openxmlformats.org/officeDocument/2006/relationships" xmlns:p="http://schemas.openxmlformats.org/presentationml/2006/main">
-  <p:cSld>
-    <p:spTree>
-      <p:nvGrpSpPr>
-        <p:cNvPr id="1" name=""/>
-        <p:cNvGrpSpPr/>
-        <p:nvPr/>
-      </p:nvGrpSpPr>
-      <p:grpSpPr>
-        <a:xfrm>
-          <a:off x="0" y="0"/>
-          <a:ext cx="0" cy="0"/>
-          <a:chOff x="0" y="0"/>
-          <a:chExt cx="0" cy="0"/>
-        </a:xfrm>
-      </p:grpSpPr>
-      <p:sp>
-        <p:nvSpPr>
-          <p:cNvPr id="2" name="Title 1"/>
-          <p:cNvSpPr>
-            <a:spLocks noGrp="1"/>
-          </p:cNvSpPr>
-          <p:nvPr>
-            <p:ph type="title"/>
-          </p:nvPr>
-        </p:nvSpPr>
-        <p:spPr/>
-        <p:txBody>
-          <a:bodyPr/>
-          <a:lstStyle/>
-          <a:p>
-            <a:r>
-              <a:rPr lang="en-US" sz="9600" dirty="0" smtClean="0"/>
-              <a:t>demo</a:t>
-            </a:r>
-            <a:endParaRPr lang="en-US" sz="9600" dirty="0"/>
-          </a:p>
-        </p:txBody>
-      </p:sp>
-      <p:sp>
-        <p:nvSpPr>
-          <p:cNvPr id="3" name="Text Placeholder 2"/>
-          <p:cNvSpPr>
-            <a:spLocks noGrp="1"/>
-          </p:cNvSpPr>
-          <p:nvPr>
-            <p:ph type="body" idx="1"/>
-          </p:nvPr>
-        </p:nvSpPr>
-        <p:spPr/>
-        <p:txBody>
-          <a:bodyPr/>
-          <a:lstStyle/>
-          <a:p>
-            <a:endParaRPr lang="en-US"/>
-          </a:p>
-        </p:txBody>
-      </p:sp>
-    </p:spTree>
-    <p:extLst>
-      <p:ext uri="{BB962C8B-B14F-4D97-AF65-F5344CB8AC3E}">
-        <p14:creationId xmlns:p14="http://schemas.microsoft.com/office/powerpoint/2010/main" val="921940227"/>
       </p:ext>
     </p:extLst>
   </p:cSld>
@@ -11407,7 +11981,7 @@
           <a:p>
             <a:r>
               <a:rPr lang="en-US" sz="6000" dirty="0" smtClean="0"/>
-              <a:t>conclusions</a:t>
+              <a:t>Testing</a:t>
             </a:r>
             <a:endParaRPr lang="en-US" sz="6000" dirty="0"/>
           </a:p>
@@ -11437,7 +12011,15 @@
           <a:p>
             <a:r>
               <a:rPr lang="en-US" sz="2400" spc="0" dirty="0" smtClean="0"/>
-              <a:t>The hog team</a:t>
+              <a:t>Jason </a:t>
+            </a:r>
+            <a:r>
+              <a:rPr lang="en-US" sz="2400" spc="0" dirty="0" err="1" smtClean="0"/>
+              <a:t>halpern</a:t>
+            </a:r>
+            <a:r>
+              <a:rPr lang="en-US" sz="2400" spc="0" dirty="0" smtClean="0"/>
+              <a:t> (testing/validation)</a:t>
             </a:r>
             <a:endParaRPr lang="en-US" sz="2400" spc="0" dirty="0"/>
           </a:p>
@@ -11446,7 +12028,7 @@
     </p:spTree>
     <p:extLst>
       <p:ext uri="{BB962C8B-B14F-4D97-AF65-F5344CB8AC3E}">
-        <p14:creationId xmlns:p14="http://schemas.microsoft.com/office/powerpoint/2010/main" val="3601372676"/>
+        <p14:creationId xmlns:p14="http://schemas.microsoft.com/office/powerpoint/2010/main" val="720806030"/>
       </p:ext>
     </p:extLst>
   </p:cSld>
@@ -11685,6 +12267,180 @@
           <a:lstStyle/>
           <a:p>
             <a:r>
+              <a:rPr lang="en-US" sz="9600" dirty="0" smtClean="0"/>
+              <a:t>demo</a:t>
+            </a:r>
+            <a:endParaRPr lang="en-US" sz="9600" dirty="0"/>
+          </a:p>
+        </p:txBody>
+      </p:sp>
+      <p:sp>
+        <p:nvSpPr>
+          <p:cNvPr id="3" name="Text Placeholder 2"/>
+          <p:cNvSpPr>
+            <a:spLocks noGrp="1"/>
+          </p:cNvSpPr>
+          <p:nvPr>
+            <p:ph type="body" idx="1"/>
+          </p:nvPr>
+        </p:nvSpPr>
+        <p:spPr/>
+        <p:txBody>
+          <a:bodyPr/>
+          <a:lstStyle/>
+          <a:p>
+            <a:endParaRPr lang="en-US"/>
+          </a:p>
+        </p:txBody>
+      </p:sp>
+    </p:spTree>
+    <p:extLst>
+      <p:ext uri="{BB962C8B-B14F-4D97-AF65-F5344CB8AC3E}">
+        <p14:creationId xmlns:p14="http://schemas.microsoft.com/office/powerpoint/2010/main" val="921940227"/>
+      </p:ext>
+    </p:extLst>
+  </p:cSld>
+  <p:clrMapOvr>
+    <a:masterClrMapping/>
+  </p:clrMapOvr>
+  <p:timing>
+    <p:tnLst>
+      <p:par>
+        <p:cTn xmlns:p14="http://schemas.microsoft.com/office/powerpoint/2010/main" id="1" dur="indefinite" restart="never" nodeType="tmRoot"/>
+      </p:par>
+    </p:tnLst>
+  </p:timing>
+</p:sld>
+</file>
+
+<file path=ppt/slides/slide21.xml><?xml version="1.0" encoding="utf-8"?>
+<p:sld xmlns:a="http://schemas.openxmlformats.org/drawingml/2006/main" xmlns:r="http://schemas.openxmlformats.org/officeDocument/2006/relationships" xmlns:p="http://schemas.openxmlformats.org/presentationml/2006/main">
+  <p:cSld>
+    <p:spTree>
+      <p:nvGrpSpPr>
+        <p:cNvPr id="1" name=""/>
+        <p:cNvGrpSpPr/>
+        <p:nvPr/>
+      </p:nvGrpSpPr>
+      <p:grpSpPr>
+        <a:xfrm>
+          <a:off x="0" y="0"/>
+          <a:ext cx="0" cy="0"/>
+          <a:chOff x="0" y="0"/>
+          <a:chExt cx="0" cy="0"/>
+        </a:xfrm>
+      </p:grpSpPr>
+      <p:sp>
+        <p:nvSpPr>
+          <p:cNvPr id="2" name="Title 1"/>
+          <p:cNvSpPr>
+            <a:spLocks noGrp="1"/>
+          </p:cNvSpPr>
+          <p:nvPr>
+            <p:ph type="title"/>
+          </p:nvPr>
+        </p:nvSpPr>
+        <p:spPr>
+          <a:xfrm rot="19140000">
+            <a:off x="631242" y="1776157"/>
+            <a:ext cx="5650992" cy="1207509"/>
+          </a:xfrm>
+        </p:spPr>
+        <p:txBody>
+          <a:bodyPr/>
+          <a:lstStyle/>
+          <a:p>
+            <a:r>
+              <a:rPr lang="en-US" sz="6000" dirty="0" smtClean="0"/>
+              <a:t>conclusions</a:t>
+            </a:r>
+            <a:endParaRPr lang="en-US" sz="6000" dirty="0"/>
+          </a:p>
+        </p:txBody>
+      </p:sp>
+      <p:sp>
+        <p:nvSpPr>
+          <p:cNvPr id="3" name="Text Placeholder 2"/>
+          <p:cNvSpPr>
+            <a:spLocks noGrp="1"/>
+          </p:cNvSpPr>
+          <p:nvPr>
+            <p:ph type="body" idx="1"/>
+          </p:nvPr>
+        </p:nvSpPr>
+        <p:spPr>
+          <a:xfrm rot="19140000">
+            <a:off x="938448" y="2278221"/>
+            <a:ext cx="7240656" cy="329184"/>
+          </a:xfrm>
+        </p:spPr>
+        <p:txBody>
+          <a:bodyPr>
+            <a:noAutofit/>
+          </a:bodyPr>
+          <a:lstStyle/>
+          <a:p>
+            <a:r>
+              <a:rPr lang="en-US" sz="2400" spc="0" dirty="0" smtClean="0"/>
+              <a:t>The hog team</a:t>
+            </a:r>
+            <a:endParaRPr lang="en-US" sz="2400" spc="0" dirty="0"/>
+          </a:p>
+        </p:txBody>
+      </p:sp>
+    </p:spTree>
+    <p:extLst>
+      <p:ext uri="{BB962C8B-B14F-4D97-AF65-F5344CB8AC3E}">
+        <p14:creationId xmlns:p14="http://schemas.microsoft.com/office/powerpoint/2010/main" val="3601372676"/>
+      </p:ext>
+    </p:extLst>
+  </p:cSld>
+  <p:clrMapOvr>
+    <a:masterClrMapping/>
+  </p:clrMapOvr>
+  <p:timing>
+    <p:tnLst>
+      <p:par>
+        <p:cTn xmlns:p14="http://schemas.microsoft.com/office/powerpoint/2010/main" id="1" dur="indefinite" restart="never" nodeType="tmRoot"/>
+      </p:par>
+    </p:tnLst>
+  </p:timing>
+</p:sld>
+</file>
+
+<file path=ppt/slides/slide22.xml><?xml version="1.0" encoding="utf-8"?>
+<p:sld xmlns:a="http://schemas.openxmlformats.org/drawingml/2006/main" xmlns:r="http://schemas.openxmlformats.org/officeDocument/2006/relationships" xmlns:p="http://schemas.openxmlformats.org/presentationml/2006/main">
+  <p:cSld>
+    <p:spTree>
+      <p:nvGrpSpPr>
+        <p:cNvPr id="1" name=""/>
+        <p:cNvGrpSpPr/>
+        <p:nvPr/>
+      </p:nvGrpSpPr>
+      <p:grpSpPr>
+        <a:xfrm>
+          <a:off x="0" y="0"/>
+          <a:ext cx="0" cy="0"/>
+          <a:chOff x="0" y="0"/>
+          <a:chExt cx="0" cy="0"/>
+        </a:xfrm>
+      </p:grpSpPr>
+      <p:sp>
+        <p:nvSpPr>
+          <p:cNvPr id="2" name="Title 1"/>
+          <p:cNvSpPr>
+            <a:spLocks noGrp="1"/>
+          </p:cNvSpPr>
+          <p:nvPr>
+            <p:ph type="title"/>
+          </p:nvPr>
+        </p:nvSpPr>
+        <p:spPr/>
+        <p:txBody>
+          <a:bodyPr/>
+          <a:lstStyle/>
+          <a:p>
+            <a:r>
               <a:rPr lang="en-US" dirty="0" smtClean="0"/>
               <a:t>conclusions</a:t>
             </a:r>
@@ -11788,7 +12544,7 @@
 </p:sld>
 </file>
 
-<file path=ppt/slides/slide21.xml><?xml version="1.0" encoding="utf-8"?>
+<file path=ppt/slides/slide23.xml><?xml version="1.0" encoding="utf-8"?>
 <p:sld xmlns:a="http://schemas.openxmlformats.org/drawingml/2006/main" xmlns:r="http://schemas.openxmlformats.org/officeDocument/2006/relationships" xmlns:p="http://schemas.openxmlformats.org/presentationml/2006/main">
   <p:cSld>
     <p:spTree>
@@ -12068,7 +12824,11 @@
           <a:p>
             <a:r>
               <a:rPr lang="en-US" sz="2400" b="1" cap="none" spc="0" dirty="0" smtClean="0"/>
-              <a:t>Say you…</a:t>
+              <a:t>Say </a:t>
+            </a:r>
+            <a:r>
+              <a:rPr lang="en-US" sz="2400" b="1" cap="none" spc="0" dirty="0" smtClean="0"/>
+              <a:t>you’re…</a:t>
             </a:r>
             <a:endParaRPr lang="en-US" sz="2400" b="1" cap="none" spc="0" dirty="0"/>
           </a:p>
@@ -12086,7 +12846,9 @@
         </p:nvSpPr>
         <p:spPr/>
         <p:txBody>
-          <a:bodyPr/>
+          <a:bodyPr>
+            <a:normAutofit lnSpcReduction="10000"/>
+          </a:bodyPr>
           <a:lstStyle/>
           <a:p>
             <a:pPr>
@@ -12094,13 +12856,14 @@
               <a:buChar char="•"/>
             </a:pPr>
             <a:r>
-              <a:rPr lang="en-US" dirty="0"/>
-              <a:t>a</a:t>
-            </a:r>
-            <a:r>
               <a:rPr lang="en-US" dirty="0" smtClean="0"/>
-              <a:t>re a webhost,</a:t>
-            </a:r>
+              <a:t>a corporation</a:t>
+            </a:r>
+            <a:r>
+              <a:rPr lang="en-US" dirty="0" smtClean="0"/>
+              <a:t>,</a:t>
+            </a:r>
+            <a:endParaRPr lang="en-US" dirty="0" smtClean="0"/>
           </a:p>
           <a:p>
             <a:pPr>
@@ -12108,9 +12871,14 @@
               <a:buChar char="•"/>
             </a:pPr>
             <a:r>
+              <a:rPr lang="en-US" dirty="0"/>
+              <a:t>w</a:t>
+            </a:r>
+            <a:r>
               <a:rPr lang="en-US" dirty="0" smtClean="0"/>
-              <a:t>with terabytes of web logs,</a:t>
-            </a:r>
+              <a:t>ith data from your mail server,</a:t>
+            </a:r>
+            <a:endParaRPr lang="en-US" dirty="0" smtClean="0"/>
           </a:p>
           <a:p>
             <a:pPr>
@@ -12119,15 +12887,11 @@
             </a:pPr>
             <a:r>
               <a:rPr lang="en-US" dirty="0" smtClean="0"/>
-              <a:t>and you just noticed a massive spike in avg. </a:t>
-            </a:r>
-            <a:r>
-              <a:rPr lang="en-US" smtClean="0"/>
-              <a:t>request times</a:t>
+              <a:t>and </a:t>
             </a:r>
             <a:r>
               <a:rPr lang="en-US" dirty="0" smtClean="0"/>
-              <a:t>…</a:t>
+              <a:t>you want to find out the average amount of time a client waits for a response…</a:t>
             </a:r>
             <a:endParaRPr lang="en-US" dirty="0"/>
           </a:p>
@@ -12152,8 +12916,13 @@
           <a:p>
             <a:r>
               <a:rPr lang="en-US" sz="2400" b="1" cap="none" spc="0" dirty="0"/>
-              <a:t>Say you…</a:t>
-            </a:r>
+              <a:t>Say </a:t>
+            </a:r>
+            <a:r>
+              <a:rPr lang="en-US" sz="2400" b="1" cap="none" spc="0" dirty="0" smtClean="0"/>
+              <a:t>you’re…</a:t>
+            </a:r>
+            <a:endParaRPr lang="en-US" sz="2400" b="1" cap="none" spc="0" dirty="0"/>
           </a:p>
         </p:txBody>
       </p:sp>

</xml_diff>

<commit_message>
adding in everyones slides for presentation.
</commit_message>
<xml_diff>
--- a/demo/demo.pptx
+++ b/demo/demo.pptx
@@ -5,7 +5,7 @@
     <p:sldMasterId id="2147483868" r:id="rId1"/>
   </p:sldMasterIdLst>
   <p:notesMasterIdLst>
-    <p:notesMasterId r:id="rId25"/>
+    <p:notesMasterId r:id="rId32"/>
   </p:notesMasterIdLst>
   <p:sldIdLst>
     <p:sldId id="256" r:id="rId2"/>
@@ -26,11 +26,18 @@
     <p:sldId id="273" r:id="rId17"/>
     <p:sldId id="274" r:id="rId18"/>
     <p:sldId id="269" r:id="rId19"/>
-    <p:sldId id="270" r:id="rId20"/>
-    <p:sldId id="277" r:id="rId21"/>
-    <p:sldId id="271" r:id="rId22"/>
-    <p:sldId id="276" r:id="rId23"/>
-    <p:sldId id="257" r:id="rId24"/>
+    <p:sldId id="284" r:id="rId20"/>
+    <p:sldId id="285" r:id="rId21"/>
+    <p:sldId id="270" r:id="rId22"/>
+    <p:sldId id="282" r:id="rId23"/>
+    <p:sldId id="283" r:id="rId24"/>
+    <p:sldId id="277" r:id="rId25"/>
+    <p:sldId id="271" r:id="rId26"/>
+    <p:sldId id="276" r:id="rId27"/>
+    <p:sldId id="257" r:id="rId28"/>
+    <p:sldId id="286" r:id="rId29"/>
+    <p:sldId id="287" r:id="rId30"/>
+    <p:sldId id="288" r:id="rId31"/>
   </p:sldIdLst>
   <p:sldSz cx="9144000" cy="6858000" type="screen4x3"/>
   <p:notesSz cx="6858000" cy="9144000"/>
@@ -548,6 +555,174 @@
             <a:fld id="{42BEFFAC-3482-42C7-A3E5-AAF6C77BD00F}" type="slidenum">
               <a:rPr lang="en-US" smtClean="0"/>
               <a:t>17</a:t>
+            </a:fld>
+            <a:endParaRPr lang="en-US"/>
+          </a:p>
+        </p:txBody>
+      </p:sp>
+    </p:spTree>
+    <p:extLst>
+      <p:ext uri="{BB962C8B-B14F-4D97-AF65-F5344CB8AC3E}">
+        <p14:creationId xmlns:p14="http://schemas.microsoft.com/office/powerpoint/2010/main" val="2846256888"/>
+      </p:ext>
+    </p:extLst>
+  </p:cSld>
+  <p:clrMapOvr>
+    <a:masterClrMapping/>
+  </p:clrMapOvr>
+</p:notes>
+</file>
+
+<file path=ppt/notesSlides/notesSlide2.xml><?xml version="1.0" encoding="utf-8"?>
+<p:notes xmlns:a="http://schemas.openxmlformats.org/drawingml/2006/main" xmlns:r="http://schemas.openxmlformats.org/officeDocument/2006/relationships" xmlns:p="http://schemas.openxmlformats.org/presentationml/2006/main">
+  <p:cSld>
+    <p:spTree>
+      <p:nvGrpSpPr>
+        <p:cNvPr id="1" name=""/>
+        <p:cNvGrpSpPr/>
+        <p:nvPr/>
+      </p:nvGrpSpPr>
+      <p:grpSpPr>
+        <a:xfrm>
+          <a:off x="0" y="0"/>
+          <a:ext cx="0" cy="0"/>
+          <a:chOff x="0" y="0"/>
+          <a:chExt cx="0" cy="0"/>
+        </a:xfrm>
+      </p:grpSpPr>
+      <p:sp>
+        <p:nvSpPr>
+          <p:cNvPr id="2" name="Slide Image Placeholder 1"/>
+          <p:cNvSpPr>
+            <a:spLocks noGrp="1" noRot="1" noChangeAspect="1"/>
+          </p:cNvSpPr>
+          <p:nvPr>
+            <p:ph type="sldImg"/>
+          </p:nvPr>
+        </p:nvSpPr>
+        <p:spPr/>
+      </p:sp>
+      <p:sp>
+        <p:nvSpPr>
+          <p:cNvPr id="3" name="Notes Placeholder 2"/>
+          <p:cNvSpPr>
+            <a:spLocks noGrp="1"/>
+          </p:cNvSpPr>
+          <p:nvPr>
+            <p:ph type="body" idx="1"/>
+          </p:nvPr>
+        </p:nvSpPr>
+        <p:spPr/>
+        <p:txBody>
+          <a:bodyPr/>
+          <a:lstStyle/>
+          <a:p>
+            <a:endParaRPr lang="en-US" dirty="0"/>
+          </a:p>
+        </p:txBody>
+      </p:sp>
+      <p:sp>
+        <p:nvSpPr>
+          <p:cNvPr id="4" name="Slide Number Placeholder 3"/>
+          <p:cNvSpPr>
+            <a:spLocks noGrp="1"/>
+          </p:cNvSpPr>
+          <p:nvPr>
+            <p:ph type="sldNum" sz="quarter" idx="10"/>
+          </p:nvPr>
+        </p:nvSpPr>
+        <p:spPr/>
+        <p:txBody>
+          <a:bodyPr/>
+          <a:lstStyle/>
+          <a:p>
+            <a:fld id="{42BEFFAC-3482-42C7-A3E5-AAF6C77BD00F}" type="slidenum">
+              <a:rPr lang="en-US" smtClean="0"/>
+              <a:t>22</a:t>
+            </a:fld>
+            <a:endParaRPr lang="en-US"/>
+          </a:p>
+        </p:txBody>
+      </p:sp>
+    </p:spTree>
+    <p:extLst>
+      <p:ext uri="{BB962C8B-B14F-4D97-AF65-F5344CB8AC3E}">
+        <p14:creationId xmlns:p14="http://schemas.microsoft.com/office/powerpoint/2010/main" val="2846256888"/>
+      </p:ext>
+    </p:extLst>
+  </p:cSld>
+  <p:clrMapOvr>
+    <a:masterClrMapping/>
+  </p:clrMapOvr>
+</p:notes>
+</file>
+
+<file path=ppt/notesSlides/notesSlide3.xml><?xml version="1.0" encoding="utf-8"?>
+<p:notes xmlns:a="http://schemas.openxmlformats.org/drawingml/2006/main" xmlns:r="http://schemas.openxmlformats.org/officeDocument/2006/relationships" xmlns:p="http://schemas.openxmlformats.org/presentationml/2006/main">
+  <p:cSld>
+    <p:spTree>
+      <p:nvGrpSpPr>
+        <p:cNvPr id="1" name=""/>
+        <p:cNvGrpSpPr/>
+        <p:nvPr/>
+      </p:nvGrpSpPr>
+      <p:grpSpPr>
+        <a:xfrm>
+          <a:off x="0" y="0"/>
+          <a:ext cx="0" cy="0"/>
+          <a:chOff x="0" y="0"/>
+          <a:chExt cx="0" cy="0"/>
+        </a:xfrm>
+      </p:grpSpPr>
+      <p:sp>
+        <p:nvSpPr>
+          <p:cNvPr id="2" name="Slide Image Placeholder 1"/>
+          <p:cNvSpPr>
+            <a:spLocks noGrp="1" noRot="1" noChangeAspect="1"/>
+          </p:cNvSpPr>
+          <p:nvPr>
+            <p:ph type="sldImg"/>
+          </p:nvPr>
+        </p:nvSpPr>
+        <p:spPr/>
+      </p:sp>
+      <p:sp>
+        <p:nvSpPr>
+          <p:cNvPr id="3" name="Notes Placeholder 2"/>
+          <p:cNvSpPr>
+            <a:spLocks noGrp="1"/>
+          </p:cNvSpPr>
+          <p:nvPr>
+            <p:ph type="body" idx="1"/>
+          </p:nvPr>
+        </p:nvSpPr>
+        <p:spPr/>
+        <p:txBody>
+          <a:bodyPr/>
+          <a:lstStyle/>
+          <a:p>
+            <a:endParaRPr lang="en-US" dirty="0"/>
+          </a:p>
+        </p:txBody>
+      </p:sp>
+      <p:sp>
+        <p:nvSpPr>
+          <p:cNvPr id="4" name="Slide Number Placeholder 3"/>
+          <p:cNvSpPr>
+            <a:spLocks noGrp="1"/>
+          </p:cNvSpPr>
+          <p:nvPr>
+            <p:ph type="sldNum" sz="quarter" idx="10"/>
+          </p:nvPr>
+        </p:nvSpPr>
+        <p:spPr/>
+        <p:txBody>
+          <a:bodyPr/>
+          <a:lstStyle/>
+          <a:p>
+            <a:fld id="{42BEFFAC-3482-42C7-A3E5-AAF6C77BD00F}" type="slidenum">
+              <a:rPr lang="en-US" smtClean="0"/>
+              <a:t>23</a:t>
             </a:fld>
             <a:endParaRPr lang="en-US"/>
           </a:p>
@@ -6298,11 +6473,18 @@
               </a:spcBef>
             </a:pPr>
             <a:r>
+              <a:rPr lang="en-US" dirty="0" smtClean="0">
+                <a:latin typeface="Lucida Console"/>
+                <a:cs typeface="Lucida Console"/>
+              </a:rPr>
+              <a:t>17 @</a:t>
+            </a:r>
+            <a:r>
               <a:rPr lang="en-US" dirty="0">
                 <a:latin typeface="Lucida Console"/>
                 <a:cs typeface="Lucida Console"/>
               </a:rPr>
-              <a:t>@Main {</a:t>
+              <a:t>Main {</a:t>
             </a:r>
           </a:p>
           <a:p>
@@ -6312,11 +6494,18 @@
               </a:spcBef>
             </a:pPr>
             <a:r>
+              <a:rPr lang="en-US" dirty="0" smtClean="0">
+                <a:latin typeface="Lucida Console"/>
+                <a:cs typeface="Lucida Console"/>
+              </a:rPr>
+              <a:t>18   </a:t>
+            </a:r>
+            <a:r>
               <a:rPr lang="en-US" dirty="0">
                 <a:latin typeface="Lucida Console"/>
                 <a:cs typeface="Lucida Console"/>
               </a:rPr>
-              <a:t>  # call map reduce</a:t>
+              <a:t># call map reduce</a:t>
             </a:r>
           </a:p>
           <a:p>
@@ -6326,11 +6515,11 @@
               </a:spcBef>
             </a:pPr>
             <a:r>
-              <a:rPr lang="en-US" dirty="0">
-                <a:latin typeface="Lucida Console"/>
-                <a:cs typeface="Lucida Console"/>
-              </a:rPr>
-              <a:t>  </a:t>
+              <a:rPr lang="en-US" dirty="0" smtClean="0">
+                <a:latin typeface="Lucida Console"/>
+                <a:cs typeface="Lucida Console"/>
+              </a:rPr>
+              <a:t>19   </a:t>
             </a:r>
             <a:r>
               <a:rPr lang="en-US" dirty="0" err="1">
@@ -6354,12 +6543,16 @@
               </a:spcBef>
             </a:pPr>
             <a:r>
-              <a:rPr lang="en-US" dirty="0">
-                <a:latin typeface="Lucida Console"/>
-                <a:cs typeface="Lucida Console"/>
-              </a:rPr>
-              <a:t>}</a:t>
-            </a:r>
+              <a:rPr lang="en-US" smtClean="0">
+                <a:latin typeface="Lucida Console"/>
+                <a:cs typeface="Lucida Console"/>
+              </a:rPr>
+              <a:t>20 }</a:t>
+            </a:r>
+            <a:endParaRPr lang="en-US" dirty="0">
+              <a:latin typeface="Lucida Console"/>
+              <a:cs typeface="Lucida Console"/>
+            </a:endParaRPr>
           </a:p>
           <a:p>
             <a:endParaRPr lang="en-US" dirty="0"/>
@@ -7174,11 +7367,7 @@
           <a:p>
             <a:r>
               <a:rPr lang="en-US" dirty="0" smtClean="0"/>
-              <a:t>The simplest </a:t>
-            </a:r>
-            <a:r>
-              <a:rPr lang="en-US" dirty="0" smtClean="0"/>
-              <a:t>distributed sort</a:t>
+              <a:t>The simplest distributed sort</a:t>
             </a:r>
             <a:endParaRPr lang="en-US" dirty="0"/>
           </a:p>
@@ -11970,65 +12159,109 @@
           </p:nvPr>
         </p:nvSpPr>
         <p:spPr>
-          <a:xfrm rot="19140000">
-            <a:off x="631242" y="1776157"/>
-            <a:ext cx="5650992" cy="1207509"/>
+          <a:xfrm>
+            <a:off x="747358" y="368683"/>
+            <a:ext cx="7520940" cy="548640"/>
           </a:xfrm>
         </p:spPr>
         <p:txBody>
-          <a:bodyPr/>
+          <a:bodyPr>
+            <a:normAutofit/>
+          </a:bodyPr>
           <a:lstStyle/>
           <a:p>
             <a:r>
-              <a:rPr lang="en-US" sz="6000" dirty="0" smtClean="0"/>
-              <a:t>Testing</a:t>
-            </a:r>
-            <a:endParaRPr lang="en-US" sz="6000" dirty="0"/>
+              <a:rPr lang="en-US" dirty="0" smtClean="0"/>
+              <a:t>Makefile and Shellscript</a:t>
+            </a:r>
+            <a:endParaRPr lang="en-US" dirty="0"/>
           </a:p>
         </p:txBody>
       </p:sp>
       <p:sp>
         <p:nvSpPr>
-          <p:cNvPr id="3" name="Text Placeholder 2"/>
+          <p:cNvPr id="3" name="Content Placeholder 2"/>
           <p:cNvSpPr>
             <a:spLocks noGrp="1"/>
           </p:cNvSpPr>
           <p:nvPr>
-            <p:ph type="body" idx="1"/>
+            <p:ph idx="1"/>
           </p:nvPr>
         </p:nvSpPr>
         <p:spPr>
-          <a:xfrm rot="19140000">
-            <a:off x="938448" y="2278221"/>
-            <a:ext cx="7240656" cy="329184"/>
+          <a:xfrm>
+            <a:off x="822959" y="1100628"/>
+            <a:ext cx="7763633" cy="3579849"/>
           </a:xfrm>
         </p:spPr>
         <p:txBody>
           <a:bodyPr>
-            <a:noAutofit/>
+            <a:normAutofit/>
           </a:bodyPr>
           <a:lstStyle/>
           <a:p>
-            <a:r>
-              <a:rPr lang="en-US" sz="2400" spc="0" dirty="0" smtClean="0"/>
-              <a:t>Jason </a:t>
-            </a:r>
-            <a:r>
-              <a:rPr lang="en-US" sz="2400" spc="0" dirty="0" err="1" smtClean="0"/>
-              <a:t>halpern</a:t>
-            </a:r>
-            <a:r>
-              <a:rPr lang="en-US" sz="2400" spc="0" dirty="0" smtClean="0"/>
-              <a:t> (testing/validation)</a:t>
-            </a:r>
-            <a:endParaRPr lang="en-US" sz="2400" spc="0" dirty="0"/>
+            <a:pPr>
+              <a:buFont typeface="Arial"/>
+              <a:buChar char="•"/>
+            </a:pPr>
+            <a:r>
+              <a:rPr lang="en-US" sz="2400" dirty="0" smtClean="0"/>
+              <a:t>Hog Compiler - Compiles Hog Source to Java Source</a:t>
+            </a:r>
+          </a:p>
+          <a:p>
+            <a:pPr>
+              <a:buFont typeface="Arial"/>
+              <a:buChar char="•"/>
+            </a:pPr>
+            <a:r>
+              <a:rPr lang="en-US" sz="2400" dirty="0" smtClean="0"/>
+              <a:t>Java Compiler – Compiles Java Source with Hadoop Jars</a:t>
+            </a:r>
+          </a:p>
+          <a:p>
+            <a:pPr>
+              <a:buFont typeface="Arial"/>
+              <a:buChar char="•"/>
+            </a:pPr>
+            <a:r>
+              <a:rPr lang="en-US" sz="2400" dirty="0" smtClean="0"/>
+              <a:t>Copies Input Data into HDFS</a:t>
+            </a:r>
+          </a:p>
+          <a:p>
+            <a:pPr>
+              <a:buFont typeface="Arial"/>
+              <a:buChar char="•"/>
+            </a:pPr>
+            <a:r>
+              <a:rPr lang="en-US" sz="2400" dirty="0" smtClean="0"/>
+              <a:t>Executes Job on Hadoop Cluster</a:t>
+            </a:r>
+          </a:p>
+          <a:p>
+            <a:pPr>
+              <a:buFont typeface="Arial"/>
+              <a:buChar char="•"/>
+            </a:pPr>
+            <a:r>
+              <a:rPr lang="en-US" sz="2400" dirty="0" smtClean="0"/>
+              <a:t>Reports Results to User</a:t>
+            </a:r>
+          </a:p>
+          <a:p>
+            <a:pPr>
+              <a:buFont typeface="Arial"/>
+              <a:buChar char="•"/>
+            </a:pPr>
+            <a:endParaRPr lang="en-US" sz="2400" dirty="0"/>
           </a:p>
         </p:txBody>
       </p:sp>
     </p:spTree>
     <p:extLst>
       <p:ext uri="{BB962C8B-B14F-4D97-AF65-F5344CB8AC3E}">
-        <p14:creationId xmlns:p14="http://schemas.microsoft.com/office/powerpoint/2010/main" val="720806030"/>
+        <p14:creationId xmlns:p14="http://schemas.microsoft.com/office/powerpoint/2010/main" val="410423861"/>
       </p:ext>
     </p:extLst>
   </p:cSld>
@@ -12261,42 +12494,420 @@
             <p:ph type="title"/>
           </p:nvPr>
         </p:nvSpPr>
-        <p:spPr/>
+        <p:spPr>
+          <a:xfrm>
+            <a:off x="747358" y="368683"/>
+            <a:ext cx="7520940" cy="548640"/>
+          </a:xfrm>
+        </p:spPr>
         <p:txBody>
-          <a:bodyPr/>
+          <a:bodyPr>
+            <a:normAutofit/>
+          </a:bodyPr>
           <a:lstStyle/>
           <a:p>
             <a:r>
-              <a:rPr lang="en-US" sz="9600" dirty="0" smtClean="0"/>
-              <a:t>demo</a:t>
-            </a:r>
-            <a:endParaRPr lang="en-US" sz="9600" dirty="0"/>
+              <a:rPr lang="en-US" dirty="0" smtClean="0"/>
+              <a:t>Runtime Environment</a:t>
+            </a:r>
+            <a:endParaRPr lang="en-US" dirty="0"/>
           </a:p>
         </p:txBody>
       </p:sp>
-      <p:sp>
-        <p:nvSpPr>
-          <p:cNvPr id="3" name="Text Placeholder 2"/>
-          <p:cNvSpPr>
-            <a:spLocks noGrp="1"/>
-          </p:cNvSpPr>
+      <p:graphicFrame>
+        <p:nvGraphicFramePr>
+          <p:cNvPr id="4" name="Content Placeholder 3"/>
+          <p:cNvGraphicFramePr>
+            <a:graphicFrameLocks noGrp="1"/>
+          </p:cNvGraphicFramePr>
           <p:nvPr>
-            <p:ph type="body" idx="1"/>
+            <p:ph idx="1"/>
+            <p:extLst>
+              <p:ext uri="{D42A27DB-BD31-4B8C-83A1-F6EECF244321}">
+                <p14:modId xmlns:p14="http://schemas.microsoft.com/office/powerpoint/2010/main" val="3231292863"/>
+              </p:ext>
+            </p:extLst>
           </p:nvPr>
-        </p:nvSpPr>
-        <p:spPr/>
-        <p:txBody>
-          <a:bodyPr/>
-          <a:lstStyle/>
-          <a:p>
-            <a:endParaRPr lang="en-US"/>
-          </a:p>
-        </p:txBody>
-      </p:sp>
+        </p:nvGraphicFramePr>
+        <p:xfrm>
+          <a:off x="287286" y="942671"/>
+          <a:ext cx="8558088" cy="3912221"/>
+        </p:xfrm>
+        <a:graphic>
+          <a:graphicData uri="http://schemas.openxmlformats.org/drawingml/2006/table">
+            <a:tbl>
+              <a:tblPr firstRow="1" bandRow="1">
+                <a:tableStyleId>{2D5ABB26-0587-4C30-8999-92F81FD0307C}</a:tableStyleId>
+              </a:tblPr>
+              <a:tblGrid>
+                <a:gridCol w="2852696"/>
+                <a:gridCol w="2852696"/>
+                <a:gridCol w="2852696"/>
+              </a:tblGrid>
+              <a:tr h="572554">
+                <a:tc>
+                  <a:txBody>
+                    <a:bodyPr/>
+                    <a:lstStyle/>
+                    <a:p>
+                      <a:pPr algn="ctr"/>
+                      <a:r>
+                        <a:rPr lang="en-US" dirty="0" smtClean="0"/>
+                        <a:t>JVM</a:t>
+                      </a:r>
+                      <a:endParaRPr lang="en-US" dirty="0"/>
+                    </a:p>
+                  </a:txBody>
+                  <a:tcPr/>
+                </a:tc>
+                <a:tc>
+                  <a:txBody>
+                    <a:bodyPr/>
+                    <a:lstStyle/>
+                    <a:p>
+                      <a:r>
+                        <a:rPr lang="en-US" dirty="0" smtClean="0"/>
+                        <a:t>Default Memory Used (MB)</a:t>
+                      </a:r>
+                    </a:p>
+                    <a:p>
+                      <a:endParaRPr lang="en-US" dirty="0"/>
+                    </a:p>
+                  </a:txBody>
+                  <a:tcPr/>
+                </a:tc>
+                <a:tc>
+                  <a:txBody>
+                    <a:bodyPr/>
+                    <a:lstStyle/>
+                    <a:p>
+                      <a:r>
+                        <a:rPr lang="en-US" dirty="0" smtClean="0"/>
+                        <a:t>Memory Used for 8</a:t>
+                      </a:r>
+                      <a:r>
+                        <a:rPr lang="en-US" baseline="0" dirty="0" smtClean="0"/>
+                        <a:t> Processors</a:t>
+                      </a:r>
+                      <a:endParaRPr lang="en-US" dirty="0"/>
+                    </a:p>
+                  </a:txBody>
+                  <a:tcPr/>
+                </a:tc>
+              </a:tr>
+              <a:tr h="572554">
+                <a:tc>
+                  <a:txBody>
+                    <a:bodyPr/>
+                    <a:lstStyle/>
+                    <a:p>
+                      <a:r>
+                        <a:rPr lang="en-US" dirty="0" smtClean="0"/>
+                        <a:t>Datanode</a:t>
+                      </a:r>
+                      <a:endParaRPr lang="en-US" dirty="0"/>
+                    </a:p>
+                  </a:txBody>
+                  <a:tcPr/>
+                </a:tc>
+                <a:tc>
+                  <a:txBody>
+                    <a:bodyPr/>
+                    <a:lstStyle/>
+                    <a:p>
+                      <a:r>
+                        <a:rPr lang="en-US" dirty="0" smtClean="0"/>
+                        <a:t>1,000</a:t>
+                      </a:r>
+                      <a:endParaRPr lang="en-US" dirty="0"/>
+                    </a:p>
+                  </a:txBody>
+                  <a:tcPr/>
+                </a:tc>
+                <a:tc>
+                  <a:txBody>
+                    <a:bodyPr/>
+                    <a:lstStyle/>
+                    <a:p>
+                      <a:r>
+                        <a:rPr lang="en-US" dirty="0" smtClean="0"/>
+                        <a:t>1,000</a:t>
+                      </a:r>
+                      <a:endParaRPr lang="en-US" dirty="0"/>
+                    </a:p>
+                  </a:txBody>
+                  <a:tcPr/>
+                </a:tc>
+              </a:tr>
+              <a:tr h="572554">
+                <a:tc>
+                  <a:txBody>
+                    <a:bodyPr/>
+                    <a:lstStyle/>
+                    <a:p>
+                      <a:r>
+                        <a:rPr lang="en-US" dirty="0" smtClean="0"/>
+                        <a:t>Tasktracker</a:t>
+                      </a:r>
+                      <a:endParaRPr lang="en-US" dirty="0"/>
+                    </a:p>
+                  </a:txBody>
+                  <a:tcPr/>
+                </a:tc>
+                <a:tc>
+                  <a:txBody>
+                    <a:bodyPr/>
+                    <a:lstStyle/>
+                    <a:p>
+                      <a:r>
+                        <a:rPr lang="en-US" dirty="0" smtClean="0"/>
+                        <a:t>1,000</a:t>
+                      </a:r>
+                      <a:endParaRPr lang="en-US" dirty="0"/>
+                    </a:p>
+                  </a:txBody>
+                  <a:tcPr/>
+                </a:tc>
+                <a:tc>
+                  <a:txBody>
+                    <a:bodyPr/>
+                    <a:lstStyle/>
+                    <a:p>
+                      <a:r>
+                        <a:rPr lang="en-US" dirty="0" smtClean="0"/>
+                        <a:t>1,000</a:t>
+                      </a:r>
+                      <a:endParaRPr lang="en-US" dirty="0"/>
+                    </a:p>
+                  </a:txBody>
+                  <a:tcPr/>
+                </a:tc>
+              </a:tr>
+              <a:tr h="572554">
+                <a:tc>
+                  <a:txBody>
+                    <a:bodyPr/>
+                    <a:lstStyle/>
+                    <a:p>
+                      <a:r>
+                        <a:rPr lang="en-US" dirty="0" smtClean="0"/>
+                        <a:t>Tasktracker Child</a:t>
+                      </a:r>
+                      <a:r>
+                        <a:rPr lang="en-US" baseline="0" dirty="0" smtClean="0"/>
+                        <a:t> Map Task</a:t>
+                      </a:r>
+                      <a:endParaRPr lang="en-US" dirty="0"/>
+                    </a:p>
+                  </a:txBody>
+                  <a:tcPr/>
+                </a:tc>
+                <a:tc>
+                  <a:txBody>
+                    <a:bodyPr/>
+                    <a:lstStyle/>
+                    <a:p>
+                      <a:r>
+                        <a:rPr lang="en-US" dirty="0" smtClean="0"/>
+                        <a:t>2x200</a:t>
+                      </a:r>
+                      <a:endParaRPr lang="en-US" dirty="0"/>
+                    </a:p>
+                  </a:txBody>
+                  <a:tcPr/>
+                </a:tc>
+                <a:tc>
+                  <a:txBody>
+                    <a:bodyPr/>
+                    <a:lstStyle/>
+                    <a:p>
+                      <a:pPr marL="0" marR="0" indent="0" algn="l" defTabSz="914400" rtl="0" eaLnBrk="1" fontAlgn="auto" latinLnBrk="0" hangingPunct="1">
+                        <a:lnSpc>
+                          <a:spcPct val="100000"/>
+                        </a:lnSpc>
+                        <a:spcBef>
+                          <a:spcPts val="0"/>
+                        </a:spcBef>
+                        <a:spcAft>
+                          <a:spcPts val="0"/>
+                        </a:spcAft>
+                        <a:buClrTx/>
+                        <a:buSzTx/>
+                        <a:buFontTx/>
+                        <a:buNone/>
+                        <a:tabLst/>
+                        <a:defRPr/>
+                      </a:pPr>
+                      <a:r>
+                        <a:rPr lang="en-US" dirty="0" smtClean="0"/>
+                        <a:t>7x400</a:t>
+                      </a:r>
+                    </a:p>
+                    <a:p>
+                      <a:endParaRPr lang="en-US" dirty="0"/>
+                    </a:p>
+                  </a:txBody>
+                  <a:tcPr/>
+                </a:tc>
+              </a:tr>
+              <a:tr h="572554">
+                <a:tc>
+                  <a:txBody>
+                    <a:bodyPr/>
+                    <a:lstStyle/>
+                    <a:p>
+                      <a:pPr marL="0" marR="0" indent="0" algn="l" defTabSz="914400" rtl="0" eaLnBrk="1" fontAlgn="auto" latinLnBrk="0" hangingPunct="1">
+                        <a:lnSpc>
+                          <a:spcPct val="100000"/>
+                        </a:lnSpc>
+                        <a:spcBef>
+                          <a:spcPts val="0"/>
+                        </a:spcBef>
+                        <a:spcAft>
+                          <a:spcPts val="0"/>
+                        </a:spcAft>
+                        <a:buClrTx/>
+                        <a:buSzTx/>
+                        <a:buFontTx/>
+                        <a:buNone/>
+                        <a:tabLst/>
+                        <a:defRPr/>
+                      </a:pPr>
+                      <a:r>
+                        <a:rPr lang="en-US" dirty="0" smtClean="0"/>
+                        <a:t>Tasktracker Child</a:t>
+                      </a:r>
+                      <a:r>
+                        <a:rPr lang="en-US" baseline="0" dirty="0" smtClean="0"/>
+                        <a:t> Reduce Task</a:t>
+                      </a:r>
+                      <a:endParaRPr lang="en-US" dirty="0" smtClean="0"/>
+                    </a:p>
+                    <a:p>
+                      <a:endParaRPr lang="en-US" dirty="0"/>
+                    </a:p>
+                  </a:txBody>
+                  <a:tcPr/>
+                </a:tc>
+                <a:tc>
+                  <a:txBody>
+                    <a:bodyPr/>
+                    <a:lstStyle/>
+                    <a:p>
+                      <a:pPr marL="0" marR="0" indent="0" algn="l" defTabSz="914400" rtl="0" eaLnBrk="1" fontAlgn="auto" latinLnBrk="0" hangingPunct="1">
+                        <a:lnSpc>
+                          <a:spcPct val="100000"/>
+                        </a:lnSpc>
+                        <a:spcBef>
+                          <a:spcPts val="0"/>
+                        </a:spcBef>
+                        <a:spcAft>
+                          <a:spcPts val="0"/>
+                        </a:spcAft>
+                        <a:buClrTx/>
+                        <a:buSzTx/>
+                        <a:buFontTx/>
+                        <a:buNone/>
+                        <a:tabLst/>
+                        <a:defRPr/>
+                      </a:pPr>
+                      <a:r>
+                        <a:rPr lang="en-US" dirty="0" smtClean="0"/>
+                        <a:t>2x200</a:t>
+                      </a:r>
+                    </a:p>
+                    <a:p>
+                      <a:endParaRPr lang="en-US" dirty="0"/>
+                    </a:p>
+                  </a:txBody>
+                  <a:tcPr/>
+                </a:tc>
+                <a:tc>
+                  <a:txBody>
+                    <a:bodyPr/>
+                    <a:lstStyle/>
+                    <a:p>
+                      <a:pPr marL="0" marR="0" indent="0" algn="l" defTabSz="914400" rtl="0" eaLnBrk="1" fontAlgn="auto" latinLnBrk="0" hangingPunct="1">
+                        <a:lnSpc>
+                          <a:spcPct val="100000"/>
+                        </a:lnSpc>
+                        <a:spcBef>
+                          <a:spcPts val="0"/>
+                        </a:spcBef>
+                        <a:spcAft>
+                          <a:spcPts val="0"/>
+                        </a:spcAft>
+                        <a:buClrTx/>
+                        <a:buSzTx/>
+                        <a:buFontTx/>
+                        <a:buNone/>
+                        <a:tabLst/>
+                        <a:defRPr/>
+                      </a:pPr>
+                      <a:r>
+                        <a:rPr lang="en-US" dirty="0" smtClean="0"/>
+                        <a:t>7x400</a:t>
+                      </a:r>
+                    </a:p>
+                    <a:p>
+                      <a:endParaRPr lang="en-US" dirty="0"/>
+                    </a:p>
+                  </a:txBody>
+                  <a:tcPr/>
+                </a:tc>
+              </a:tr>
+              <a:tr h="572554">
+                <a:tc>
+                  <a:txBody>
+                    <a:bodyPr/>
+                    <a:lstStyle/>
+                    <a:p>
+                      <a:r>
+                        <a:rPr lang="en-US" dirty="0" smtClean="0"/>
+                        <a:t>Total</a:t>
+                      </a:r>
+                      <a:endParaRPr lang="en-US" dirty="0"/>
+                    </a:p>
+                  </a:txBody>
+                  <a:tcPr/>
+                </a:tc>
+                <a:tc>
+                  <a:txBody>
+                    <a:bodyPr/>
+                    <a:lstStyle/>
+                    <a:p>
+                      <a:r>
+                        <a:rPr lang="en-US" dirty="0" smtClean="0"/>
+                        <a:t>2,800</a:t>
+                      </a:r>
+                      <a:endParaRPr lang="en-US" dirty="0"/>
+                    </a:p>
+                  </a:txBody>
+                  <a:tcPr/>
+                </a:tc>
+                <a:tc>
+                  <a:txBody>
+                    <a:bodyPr/>
+                    <a:lstStyle/>
+                    <a:p>
+                      <a:r>
+                        <a:rPr lang="en-US" dirty="0" smtClean="0"/>
+                        <a:t>7,600</a:t>
+                      </a:r>
+                      <a:endParaRPr lang="en-US" dirty="0"/>
+                    </a:p>
+                  </a:txBody>
+                  <a:tcPr/>
+                </a:tc>
+              </a:tr>
+            </a:tbl>
+          </a:graphicData>
+        </a:graphic>
+      </p:graphicFrame>
     </p:spTree>
     <p:extLst>
       <p:ext uri="{BB962C8B-B14F-4D97-AF65-F5344CB8AC3E}">
-        <p14:creationId xmlns:p14="http://schemas.microsoft.com/office/powerpoint/2010/main" val="921940227"/>
+        <p14:creationId xmlns:p14="http://schemas.microsoft.com/office/powerpoint/2010/main" val="2685657611"/>
       </p:ext>
     </p:extLst>
   </p:cSld>
@@ -12352,7 +12963,7 @@
           <a:p>
             <a:r>
               <a:rPr lang="en-US" sz="6000" dirty="0" smtClean="0"/>
-              <a:t>conclusions</a:t>
+              <a:t>Testing</a:t>
             </a:r>
             <a:endParaRPr lang="en-US" sz="6000" dirty="0"/>
           </a:p>
@@ -12382,7 +12993,15 @@
           <a:p>
             <a:r>
               <a:rPr lang="en-US" sz="2400" spc="0" dirty="0" smtClean="0"/>
-              <a:t>The hog team</a:t>
+              <a:t>Jason </a:t>
+            </a:r>
+            <a:r>
+              <a:rPr lang="en-US" sz="2400" spc="0" dirty="0" err="1" smtClean="0"/>
+              <a:t>halpern</a:t>
+            </a:r>
+            <a:r>
+              <a:rPr lang="en-US" sz="2400" spc="0" dirty="0" smtClean="0"/>
+              <a:t> (testing/validation)</a:t>
             </a:r>
             <a:endParaRPr lang="en-US" sz="2400" spc="0" dirty="0"/>
           </a:p>
@@ -12391,7 +13010,7 @@
     </p:spTree>
     <p:extLst>
       <p:ext uri="{BB962C8B-B14F-4D97-AF65-F5344CB8AC3E}">
-        <p14:creationId xmlns:p14="http://schemas.microsoft.com/office/powerpoint/2010/main" val="3601372676"/>
+        <p14:creationId xmlns:p14="http://schemas.microsoft.com/office/powerpoint/2010/main" val="720806030"/>
       </p:ext>
     </p:extLst>
   </p:cSld>
@@ -12427,6 +13046,1106 @@
       </p:grpSpPr>
       <p:sp>
         <p:nvSpPr>
+          <p:cNvPr id="4" name="Title 3"/>
+          <p:cNvSpPr>
+            <a:spLocks noGrp="1"/>
+          </p:cNvSpPr>
+          <p:nvPr>
+            <p:ph type="title"/>
+          </p:nvPr>
+        </p:nvSpPr>
+        <p:spPr>
+          <a:xfrm>
+            <a:off x="457200" y="129498"/>
+            <a:ext cx="8229600" cy="1143000"/>
+          </a:xfrm>
+        </p:spPr>
+        <p:txBody>
+          <a:bodyPr/>
+          <a:lstStyle/>
+          <a:p>
+            <a:r>
+              <a:rPr lang="en-US" dirty="0"/>
+              <a:t>Iterative Testing </a:t>
+            </a:r>
+            <a:r>
+              <a:rPr lang="en-US" dirty="0" smtClean="0"/>
+              <a:t>Cycle</a:t>
+            </a:r>
+            <a:endParaRPr lang="en-US" dirty="0"/>
+          </a:p>
+        </p:txBody>
+      </p:sp>
+      <p:sp>
+        <p:nvSpPr>
+          <p:cNvPr id="2" name="TextBox 1"/>
+          <p:cNvSpPr txBox="1"/>
+          <p:nvPr/>
+        </p:nvSpPr>
+        <p:spPr>
+          <a:xfrm>
+            <a:off x="457200" y="1087832"/>
+            <a:ext cx="5993949" cy="2277547"/>
+          </a:xfrm>
+          <a:prstGeom prst="rect">
+            <a:avLst/>
+          </a:prstGeom>
+          <a:noFill/>
+        </p:spPr>
+        <p:txBody>
+          <a:bodyPr wrap="none" rtlCol="0">
+            <a:spAutoFit/>
+          </a:bodyPr>
+          <a:lstStyle/>
+          <a:p>
+            <a:pPr marL="285750" indent="-285750">
+              <a:buFont typeface="Arial"/>
+              <a:buChar char="•"/>
+            </a:pPr>
+            <a:r>
+              <a:rPr lang="en-US" sz="2200" dirty="0" smtClean="0"/>
+              <a:t>White Box Tests</a:t>
+            </a:r>
+          </a:p>
+          <a:p>
+            <a:pPr marL="742950" lvl="1" indent="-285750">
+              <a:buFont typeface="Arial"/>
+              <a:buChar char="•"/>
+            </a:pPr>
+            <a:r>
+              <a:rPr lang="en-US" dirty="0"/>
+              <a:t>T</a:t>
+            </a:r>
+            <a:r>
+              <a:rPr lang="en-US" dirty="0" smtClean="0"/>
+              <a:t>est </a:t>
+            </a:r>
+            <a:r>
+              <a:rPr lang="en-US" dirty="0"/>
+              <a:t>I</a:t>
+            </a:r>
+            <a:r>
+              <a:rPr lang="en-US" dirty="0" smtClean="0"/>
+              <a:t>nternal </a:t>
+            </a:r>
+            <a:r>
+              <a:rPr lang="en-US" dirty="0"/>
+              <a:t>S</a:t>
+            </a:r>
+            <a:r>
+              <a:rPr lang="en-US" dirty="0" smtClean="0"/>
+              <a:t>tructures</a:t>
+            </a:r>
+            <a:r>
+              <a:rPr lang="en-US" dirty="0"/>
+              <a:t>: token streams, nodes, ASTs </a:t>
+            </a:r>
+          </a:p>
+          <a:p>
+            <a:pPr marL="285750" indent="-285750">
+              <a:buFont typeface="Arial"/>
+              <a:buChar char="•"/>
+            </a:pPr>
+            <a:r>
+              <a:rPr lang="en-US" sz="2200" dirty="0" smtClean="0"/>
+              <a:t>Black Box </a:t>
+            </a:r>
+            <a:r>
+              <a:rPr lang="en-US" sz="2200" dirty="0"/>
+              <a:t>Tests</a:t>
+            </a:r>
+          </a:p>
+          <a:p>
+            <a:pPr marL="742950" lvl="1" indent="-285750">
+              <a:buFont typeface="Arial"/>
+              <a:buChar char="•"/>
+            </a:pPr>
+            <a:r>
+              <a:rPr lang="en-US" dirty="0"/>
+              <a:t>Test </a:t>
+            </a:r>
+            <a:r>
+              <a:rPr lang="en-US" dirty="0" smtClean="0"/>
+              <a:t>Functionality</a:t>
+            </a:r>
+          </a:p>
+          <a:p>
+            <a:pPr marL="285750" indent="-285750">
+              <a:buFont typeface="Arial"/>
+              <a:buChar char="•"/>
+            </a:pPr>
+            <a:r>
+              <a:rPr lang="en-US" sz="2200" dirty="0" smtClean="0"/>
+              <a:t>Six Phases of Unit Testing</a:t>
+            </a:r>
+          </a:p>
+          <a:p>
+            <a:endParaRPr lang="en-US" dirty="0"/>
+          </a:p>
+          <a:p>
+            <a:endParaRPr lang="en-US" sz="2200" dirty="0"/>
+          </a:p>
+        </p:txBody>
+      </p:sp>
+      <p:sp>
+        <p:nvSpPr>
+          <p:cNvPr id="29" name="Rectangle 28"/>
+          <p:cNvSpPr/>
+          <p:nvPr/>
+        </p:nvSpPr>
+        <p:spPr>
+          <a:xfrm>
+            <a:off x="580573" y="2949263"/>
+            <a:ext cx="2026101" cy="600372"/>
+          </a:xfrm>
+          <a:prstGeom prst="rect">
+            <a:avLst/>
+          </a:prstGeom>
+          <a:ln/>
+        </p:spPr>
+        <p:style>
+          <a:lnRef idx="1">
+            <a:schemeClr val="accent1"/>
+          </a:lnRef>
+          <a:fillRef idx="2">
+            <a:schemeClr val="accent1"/>
+          </a:fillRef>
+          <a:effectRef idx="1">
+            <a:schemeClr val="accent1"/>
+          </a:effectRef>
+          <a:fontRef idx="minor">
+            <a:schemeClr val="dk1"/>
+          </a:fontRef>
+        </p:style>
+        <p:txBody>
+          <a:bodyPr rtlCol="0" anchor="ctr"/>
+          <a:lstStyle/>
+          <a:p>
+            <a:pPr algn="ctr"/>
+            <a:r>
+              <a:rPr lang="en-US" sz="2000" dirty="0" err="1" smtClean="0">
+                <a:solidFill>
+                  <a:schemeClr val="tx1"/>
+                </a:solidFill>
+              </a:rPr>
+              <a:t>Lexer</a:t>
+            </a:r>
+            <a:r>
+              <a:rPr lang="en-US" sz="2000" dirty="0" smtClean="0">
+                <a:solidFill>
+                  <a:schemeClr val="tx1"/>
+                </a:solidFill>
+              </a:rPr>
+              <a:t> Testing</a:t>
+            </a:r>
+          </a:p>
+        </p:txBody>
+      </p:sp>
+      <p:sp>
+        <p:nvSpPr>
+          <p:cNvPr id="34" name="Rectangle 33"/>
+          <p:cNvSpPr/>
+          <p:nvPr/>
+        </p:nvSpPr>
+        <p:spPr>
+          <a:xfrm>
+            <a:off x="3559175" y="2932070"/>
+            <a:ext cx="1778000" cy="600372"/>
+          </a:xfrm>
+          <a:prstGeom prst="rect">
+            <a:avLst/>
+          </a:prstGeom>
+          <a:ln/>
+        </p:spPr>
+        <p:style>
+          <a:lnRef idx="1">
+            <a:schemeClr val="accent1"/>
+          </a:lnRef>
+          <a:fillRef idx="2">
+            <a:schemeClr val="accent1"/>
+          </a:fillRef>
+          <a:effectRef idx="1">
+            <a:schemeClr val="accent1"/>
+          </a:effectRef>
+          <a:fontRef idx="minor">
+            <a:schemeClr val="dk1"/>
+          </a:fontRef>
+        </p:style>
+        <p:txBody>
+          <a:bodyPr rtlCol="0" anchor="ctr"/>
+          <a:lstStyle/>
+          <a:p>
+            <a:pPr algn="ctr"/>
+            <a:r>
+              <a:rPr lang="en-US" sz="2000" dirty="0" smtClean="0">
+                <a:solidFill>
+                  <a:schemeClr val="tx1"/>
+                </a:solidFill>
+              </a:rPr>
+              <a:t>Parser Testing</a:t>
+            </a:r>
+          </a:p>
+        </p:txBody>
+      </p:sp>
+      <p:sp>
+        <p:nvSpPr>
+          <p:cNvPr id="35" name="Rectangle 34"/>
+          <p:cNvSpPr/>
+          <p:nvPr/>
+        </p:nvSpPr>
+        <p:spPr>
+          <a:xfrm>
+            <a:off x="6226175" y="2932070"/>
+            <a:ext cx="1778000" cy="600372"/>
+          </a:xfrm>
+          <a:prstGeom prst="rect">
+            <a:avLst/>
+          </a:prstGeom>
+          <a:ln/>
+        </p:spPr>
+        <p:style>
+          <a:lnRef idx="1">
+            <a:schemeClr val="accent1"/>
+          </a:lnRef>
+          <a:fillRef idx="2">
+            <a:schemeClr val="accent1"/>
+          </a:fillRef>
+          <a:effectRef idx="1">
+            <a:schemeClr val="accent1"/>
+          </a:effectRef>
+          <a:fontRef idx="minor">
+            <a:schemeClr val="dk1"/>
+          </a:fontRef>
+        </p:style>
+        <p:txBody>
+          <a:bodyPr rtlCol="0" anchor="ctr"/>
+          <a:lstStyle/>
+          <a:p>
+            <a:pPr algn="ctr"/>
+            <a:r>
+              <a:rPr lang="en-US" sz="2000" dirty="0" smtClean="0">
+                <a:solidFill>
+                  <a:schemeClr val="tx1"/>
+                </a:solidFill>
+              </a:rPr>
+              <a:t>AST Testing</a:t>
+            </a:r>
+          </a:p>
+        </p:txBody>
+      </p:sp>
+      <p:cxnSp>
+        <p:nvCxnSpPr>
+          <p:cNvPr id="36" name="Straight Arrow Connector 35"/>
+          <p:cNvCxnSpPr/>
+          <p:nvPr/>
+        </p:nvCxnSpPr>
+        <p:spPr>
+          <a:xfrm>
+            <a:off x="5337175" y="3232256"/>
+            <a:ext cx="889000" cy="0"/>
+          </a:xfrm>
+          <a:prstGeom prst="straightConnector1">
+            <a:avLst/>
+          </a:prstGeom>
+          <a:ln w="28575">
+            <a:solidFill>
+              <a:schemeClr val="tx1">
+                <a:lumMod val="75000"/>
+                <a:lumOff val="25000"/>
+              </a:schemeClr>
+            </a:solidFill>
+            <a:tailEnd type="arrow"/>
+          </a:ln>
+        </p:spPr>
+        <p:style>
+          <a:lnRef idx="1">
+            <a:schemeClr val="accent1"/>
+          </a:lnRef>
+          <a:fillRef idx="0">
+            <a:schemeClr val="accent1"/>
+          </a:fillRef>
+          <a:effectRef idx="0">
+            <a:schemeClr val="accent1"/>
+          </a:effectRef>
+          <a:fontRef idx="minor">
+            <a:schemeClr val="tx1"/>
+          </a:fontRef>
+        </p:style>
+      </p:cxnSp>
+      <p:sp>
+        <p:nvSpPr>
+          <p:cNvPr id="38" name="Rectangle 37"/>
+          <p:cNvSpPr/>
+          <p:nvPr/>
+        </p:nvSpPr>
+        <p:spPr>
+          <a:xfrm>
+            <a:off x="3559175" y="3989642"/>
+            <a:ext cx="1778000" cy="600372"/>
+          </a:xfrm>
+          <a:prstGeom prst="rect">
+            <a:avLst/>
+          </a:prstGeom>
+          <a:ln/>
+        </p:spPr>
+        <p:style>
+          <a:lnRef idx="1">
+            <a:schemeClr val="accent1"/>
+          </a:lnRef>
+          <a:fillRef idx="2">
+            <a:schemeClr val="accent1"/>
+          </a:fillRef>
+          <a:effectRef idx="1">
+            <a:schemeClr val="accent1"/>
+          </a:effectRef>
+          <a:fontRef idx="minor">
+            <a:schemeClr val="dk1"/>
+          </a:fontRef>
+        </p:style>
+        <p:txBody>
+          <a:bodyPr rtlCol="0" anchor="ctr"/>
+          <a:lstStyle/>
+          <a:p>
+            <a:pPr algn="ctr"/>
+            <a:r>
+              <a:rPr lang="en-US" sz="2000" dirty="0" smtClean="0">
+                <a:solidFill>
+                  <a:schemeClr val="tx1"/>
+                </a:solidFill>
+              </a:rPr>
+              <a:t>Symbol Table Testing</a:t>
+            </a:r>
+          </a:p>
+        </p:txBody>
+      </p:sp>
+      <p:sp>
+        <p:nvSpPr>
+          <p:cNvPr id="39" name="Rectangle 38"/>
+          <p:cNvSpPr/>
+          <p:nvPr/>
+        </p:nvSpPr>
+        <p:spPr>
+          <a:xfrm>
+            <a:off x="6226175" y="3989642"/>
+            <a:ext cx="1778000" cy="600372"/>
+          </a:xfrm>
+          <a:prstGeom prst="rect">
+            <a:avLst/>
+          </a:prstGeom>
+          <a:ln/>
+        </p:spPr>
+        <p:style>
+          <a:lnRef idx="1">
+            <a:schemeClr val="accent1"/>
+          </a:lnRef>
+          <a:fillRef idx="2">
+            <a:schemeClr val="accent1"/>
+          </a:fillRef>
+          <a:effectRef idx="1">
+            <a:schemeClr val="accent1"/>
+          </a:effectRef>
+          <a:fontRef idx="minor">
+            <a:schemeClr val="dk1"/>
+          </a:fontRef>
+        </p:style>
+        <p:txBody>
+          <a:bodyPr rtlCol="0" anchor="ctr"/>
+          <a:lstStyle/>
+          <a:p>
+            <a:pPr algn="ctr"/>
+            <a:r>
+              <a:rPr lang="en-US" sz="2000" dirty="0" smtClean="0">
+                <a:solidFill>
+                  <a:schemeClr val="tx1"/>
+                </a:solidFill>
+              </a:rPr>
+              <a:t>Type Checking Testing</a:t>
+            </a:r>
+          </a:p>
+        </p:txBody>
+      </p:sp>
+      <p:sp>
+        <p:nvSpPr>
+          <p:cNvPr id="40" name="Rectangle 39"/>
+          <p:cNvSpPr/>
+          <p:nvPr/>
+        </p:nvSpPr>
+        <p:spPr>
+          <a:xfrm>
+            <a:off x="580574" y="3989642"/>
+            <a:ext cx="2026101" cy="600372"/>
+          </a:xfrm>
+          <a:prstGeom prst="rect">
+            <a:avLst/>
+          </a:prstGeom>
+          <a:ln/>
+        </p:spPr>
+        <p:style>
+          <a:lnRef idx="1">
+            <a:schemeClr val="accent1"/>
+          </a:lnRef>
+          <a:fillRef idx="2">
+            <a:schemeClr val="accent1"/>
+          </a:fillRef>
+          <a:effectRef idx="1">
+            <a:schemeClr val="accent1"/>
+          </a:effectRef>
+          <a:fontRef idx="minor">
+            <a:schemeClr val="dk1"/>
+          </a:fontRef>
+        </p:style>
+        <p:txBody>
+          <a:bodyPr rtlCol="0" anchor="ctr"/>
+          <a:lstStyle/>
+          <a:p>
+            <a:pPr algn="ctr"/>
+            <a:r>
+              <a:rPr lang="en-US" sz="2000" dirty="0" smtClean="0">
+                <a:solidFill>
+                  <a:schemeClr val="tx1"/>
+                </a:solidFill>
+              </a:rPr>
+              <a:t>Code Generation</a:t>
+            </a:r>
+          </a:p>
+          <a:p>
+            <a:pPr algn="ctr"/>
+            <a:r>
+              <a:rPr lang="en-US" sz="2000" dirty="0" smtClean="0">
+                <a:solidFill>
+                  <a:schemeClr val="tx1"/>
+                </a:solidFill>
+              </a:rPr>
+              <a:t>Testing</a:t>
+            </a:r>
+          </a:p>
+        </p:txBody>
+      </p:sp>
+      <p:cxnSp>
+        <p:nvCxnSpPr>
+          <p:cNvPr id="44" name="Straight Arrow Connector 43"/>
+          <p:cNvCxnSpPr>
+            <a:endCxn id="34" idx="1"/>
+          </p:cNvCxnSpPr>
+          <p:nvPr/>
+        </p:nvCxnSpPr>
+        <p:spPr>
+          <a:xfrm>
+            <a:off x="2606675" y="3219662"/>
+            <a:ext cx="952500" cy="12594"/>
+          </a:xfrm>
+          <a:prstGeom prst="straightConnector1">
+            <a:avLst/>
+          </a:prstGeom>
+          <a:ln w="28575">
+            <a:solidFill>
+              <a:schemeClr val="tx1">
+                <a:lumMod val="75000"/>
+                <a:lumOff val="25000"/>
+              </a:schemeClr>
+            </a:solidFill>
+            <a:tailEnd type="arrow"/>
+          </a:ln>
+        </p:spPr>
+        <p:style>
+          <a:lnRef idx="1">
+            <a:schemeClr val="accent1"/>
+          </a:lnRef>
+          <a:fillRef idx="0">
+            <a:schemeClr val="accent1"/>
+          </a:fillRef>
+          <a:effectRef idx="0">
+            <a:schemeClr val="accent1"/>
+          </a:effectRef>
+          <a:fontRef idx="minor">
+            <a:schemeClr val="tx1"/>
+          </a:fontRef>
+        </p:style>
+      </p:cxnSp>
+      <p:cxnSp>
+        <p:nvCxnSpPr>
+          <p:cNvPr id="46" name="Straight Arrow Connector 45"/>
+          <p:cNvCxnSpPr/>
+          <p:nvPr/>
+        </p:nvCxnSpPr>
+        <p:spPr>
+          <a:xfrm flipH="1">
+            <a:off x="7156448" y="3549635"/>
+            <a:ext cx="1" cy="440007"/>
+          </a:xfrm>
+          <a:prstGeom prst="straightConnector1">
+            <a:avLst/>
+          </a:prstGeom>
+          <a:ln w="28575">
+            <a:solidFill>
+              <a:schemeClr val="tx1">
+                <a:lumMod val="75000"/>
+                <a:lumOff val="25000"/>
+              </a:schemeClr>
+            </a:solidFill>
+            <a:tailEnd type="arrow"/>
+          </a:ln>
+        </p:spPr>
+        <p:style>
+          <a:lnRef idx="1">
+            <a:schemeClr val="accent1"/>
+          </a:lnRef>
+          <a:fillRef idx="0">
+            <a:schemeClr val="accent1"/>
+          </a:fillRef>
+          <a:effectRef idx="0">
+            <a:schemeClr val="accent1"/>
+          </a:effectRef>
+          <a:fontRef idx="minor">
+            <a:schemeClr val="tx1"/>
+          </a:fontRef>
+        </p:style>
+      </p:cxnSp>
+      <p:cxnSp>
+        <p:nvCxnSpPr>
+          <p:cNvPr id="50" name="Straight Arrow Connector 49"/>
+          <p:cNvCxnSpPr/>
+          <p:nvPr/>
+        </p:nvCxnSpPr>
+        <p:spPr>
+          <a:xfrm rot="10800000">
+            <a:off x="5337175" y="4289531"/>
+            <a:ext cx="889000" cy="0"/>
+          </a:xfrm>
+          <a:prstGeom prst="straightConnector1">
+            <a:avLst/>
+          </a:prstGeom>
+          <a:ln w="28575">
+            <a:solidFill>
+              <a:schemeClr val="tx1">
+                <a:lumMod val="75000"/>
+                <a:lumOff val="25000"/>
+              </a:schemeClr>
+            </a:solidFill>
+            <a:tailEnd type="arrow"/>
+          </a:ln>
+        </p:spPr>
+        <p:style>
+          <a:lnRef idx="1">
+            <a:schemeClr val="accent1"/>
+          </a:lnRef>
+          <a:fillRef idx="0">
+            <a:schemeClr val="accent1"/>
+          </a:fillRef>
+          <a:effectRef idx="0">
+            <a:schemeClr val="accent1"/>
+          </a:effectRef>
+          <a:fontRef idx="minor">
+            <a:schemeClr val="tx1"/>
+          </a:fontRef>
+        </p:style>
+      </p:cxnSp>
+      <p:cxnSp>
+        <p:nvCxnSpPr>
+          <p:cNvPr id="51" name="Straight Arrow Connector 50"/>
+          <p:cNvCxnSpPr>
+            <a:stCxn id="38" idx="1"/>
+          </p:cNvCxnSpPr>
+          <p:nvPr/>
+        </p:nvCxnSpPr>
+        <p:spPr>
+          <a:xfrm flipH="1" flipV="1">
+            <a:off x="2606674" y="4286462"/>
+            <a:ext cx="952501" cy="3366"/>
+          </a:xfrm>
+          <a:prstGeom prst="straightConnector1">
+            <a:avLst/>
+          </a:prstGeom>
+          <a:ln w="28575">
+            <a:solidFill>
+              <a:schemeClr val="tx1">
+                <a:lumMod val="75000"/>
+                <a:lumOff val="25000"/>
+              </a:schemeClr>
+            </a:solidFill>
+            <a:tailEnd type="arrow"/>
+          </a:ln>
+        </p:spPr>
+        <p:style>
+          <a:lnRef idx="1">
+            <a:schemeClr val="accent1"/>
+          </a:lnRef>
+          <a:fillRef idx="0">
+            <a:schemeClr val="accent1"/>
+          </a:fillRef>
+          <a:effectRef idx="0">
+            <a:schemeClr val="accent1"/>
+          </a:effectRef>
+          <a:fontRef idx="minor">
+            <a:schemeClr val="tx1"/>
+          </a:fontRef>
+        </p:style>
+      </p:cxnSp>
+    </p:spTree>
+    <p:extLst>
+      <p:ext uri="{BB962C8B-B14F-4D97-AF65-F5344CB8AC3E}">
+        <p14:creationId xmlns:p14="http://schemas.microsoft.com/office/powerpoint/2010/main" val="1354366150"/>
+      </p:ext>
+    </p:extLst>
+  </p:cSld>
+  <p:clrMapOvr>
+    <a:masterClrMapping/>
+  </p:clrMapOvr>
+  <p:timing>
+    <p:tnLst>
+      <p:par>
+        <p:cTn xmlns:p14="http://schemas.microsoft.com/office/powerpoint/2010/main" id="1" dur="indefinite" restart="never" nodeType="tmRoot"/>
+      </p:par>
+    </p:tnLst>
+  </p:timing>
+</p:sld>
+</file>
+
+<file path=ppt/slides/slide23.xml><?xml version="1.0" encoding="utf-8"?>
+<p:sld xmlns:a="http://schemas.openxmlformats.org/drawingml/2006/main" xmlns:r="http://schemas.openxmlformats.org/officeDocument/2006/relationships" xmlns:p="http://schemas.openxmlformats.org/presentationml/2006/main">
+  <p:cSld>
+    <p:spTree>
+      <p:nvGrpSpPr>
+        <p:cNvPr id="1" name=""/>
+        <p:cNvGrpSpPr/>
+        <p:nvPr/>
+      </p:nvGrpSpPr>
+      <p:grpSpPr>
+        <a:xfrm>
+          <a:off x="0" y="0"/>
+          <a:ext cx="0" cy="0"/>
+          <a:chOff x="0" y="0"/>
+          <a:chExt cx="0" cy="0"/>
+        </a:xfrm>
+      </p:grpSpPr>
+      <p:sp>
+        <p:nvSpPr>
+          <p:cNvPr id="4" name="Title 3"/>
+          <p:cNvSpPr>
+            <a:spLocks noGrp="1"/>
+          </p:cNvSpPr>
+          <p:nvPr>
+            <p:ph type="title"/>
+          </p:nvPr>
+        </p:nvSpPr>
+        <p:spPr>
+          <a:xfrm>
+            <a:off x="457200" y="129498"/>
+            <a:ext cx="8229600" cy="1143000"/>
+          </a:xfrm>
+        </p:spPr>
+        <p:txBody>
+          <a:bodyPr/>
+          <a:lstStyle/>
+          <a:p>
+            <a:r>
+              <a:rPr lang="en-US" dirty="0" smtClean="0"/>
+              <a:t>INTEGRATION TESTING</a:t>
+            </a:r>
+            <a:endParaRPr lang="en-US" dirty="0"/>
+          </a:p>
+        </p:txBody>
+      </p:sp>
+      <p:sp>
+        <p:nvSpPr>
+          <p:cNvPr id="2" name="TextBox 1"/>
+          <p:cNvSpPr txBox="1"/>
+          <p:nvPr/>
+        </p:nvSpPr>
+        <p:spPr>
+          <a:xfrm>
+            <a:off x="457200" y="1087832"/>
+            <a:ext cx="5468164" cy="4031873"/>
+          </a:xfrm>
+          <a:prstGeom prst="rect">
+            <a:avLst/>
+          </a:prstGeom>
+          <a:noFill/>
+        </p:spPr>
+        <p:txBody>
+          <a:bodyPr wrap="none" rtlCol="0">
+            <a:spAutoFit/>
+          </a:bodyPr>
+          <a:lstStyle/>
+          <a:p>
+            <a:pPr marL="285750" indent="-285750">
+              <a:buFont typeface="Arial"/>
+              <a:buChar char="•"/>
+            </a:pPr>
+            <a:r>
+              <a:rPr lang="en-US" sz="2400" dirty="0" smtClean="0"/>
+              <a:t>Sample </a:t>
+            </a:r>
+            <a:r>
+              <a:rPr lang="en-US" sz="2400" dirty="0"/>
+              <a:t>Programs </a:t>
+            </a:r>
+            <a:endParaRPr lang="en-US" sz="2400" dirty="0" smtClean="0"/>
+          </a:p>
+          <a:p>
+            <a:pPr marL="742950" lvl="1" indent="-285750">
+              <a:buFont typeface="Arial"/>
+              <a:buChar char="•"/>
+            </a:pPr>
+            <a:r>
+              <a:rPr lang="en-US" dirty="0" smtClean="0"/>
+              <a:t>Word Count</a:t>
+            </a:r>
+          </a:p>
+          <a:p>
+            <a:pPr marL="742950" lvl="1" indent="-285750">
+              <a:buFont typeface="Arial"/>
+              <a:buChar char="•"/>
+            </a:pPr>
+            <a:r>
+              <a:rPr lang="en-US" dirty="0" smtClean="0"/>
+              <a:t>Sort</a:t>
+            </a:r>
+          </a:p>
+          <a:p>
+            <a:pPr marL="742950" lvl="1" indent="-285750">
+              <a:buFont typeface="Arial"/>
+              <a:buChar char="•"/>
+            </a:pPr>
+            <a:r>
+              <a:rPr lang="en-US" dirty="0" smtClean="0"/>
+              <a:t>Log Processing</a:t>
+            </a:r>
+            <a:endParaRPr lang="en-US" dirty="0"/>
+          </a:p>
+          <a:p>
+            <a:pPr marL="285750" indent="-285750">
+              <a:buFont typeface="Arial"/>
+              <a:buChar char="•"/>
+            </a:pPr>
+            <a:r>
+              <a:rPr lang="en-US" sz="2400" dirty="0"/>
+              <a:t>Exception Handling and Errors </a:t>
+            </a:r>
+            <a:endParaRPr lang="en-US" sz="2400" dirty="0" smtClean="0"/>
+          </a:p>
+          <a:p>
+            <a:pPr marL="742950" lvl="1" indent="-285750">
+              <a:buFont typeface="Arial"/>
+              <a:buChar char="•"/>
+            </a:pPr>
+            <a:r>
+              <a:rPr lang="en-US" dirty="0" smtClean="0"/>
+              <a:t>Undeclared Variables</a:t>
+            </a:r>
+          </a:p>
+          <a:p>
+            <a:pPr marL="742950" lvl="1" indent="-285750">
+              <a:buFont typeface="Arial"/>
+              <a:buChar char="•"/>
+            </a:pPr>
+            <a:r>
+              <a:rPr lang="en-US" dirty="0" smtClean="0"/>
+              <a:t>Invalid Arguments</a:t>
+            </a:r>
+          </a:p>
+          <a:p>
+            <a:pPr marL="742950" lvl="1" indent="-285750">
+              <a:buFont typeface="Arial"/>
+              <a:buChar char="•"/>
+            </a:pPr>
+            <a:r>
+              <a:rPr lang="en-US" dirty="0" smtClean="0"/>
+              <a:t>Type Mismatch</a:t>
+            </a:r>
+          </a:p>
+          <a:p>
+            <a:pPr marL="285750" indent="-285750">
+              <a:buFont typeface="Arial"/>
+              <a:buChar char="•"/>
+            </a:pPr>
+            <a:r>
+              <a:rPr lang="en-US" sz="2400" dirty="0" smtClean="0"/>
+              <a:t>Testing on Amazon </a:t>
+            </a:r>
+            <a:r>
+              <a:rPr lang="en-US" sz="2400" dirty="0"/>
+              <a:t>Elastic </a:t>
+            </a:r>
+            <a:r>
+              <a:rPr lang="en-US" sz="2400" dirty="0" err="1"/>
+              <a:t>MapReduce</a:t>
+            </a:r>
+            <a:r>
+              <a:rPr lang="en-US" sz="2400" dirty="0"/>
+              <a:t> </a:t>
+            </a:r>
+            <a:endParaRPr lang="en-US" sz="2400" dirty="0" smtClean="0"/>
+          </a:p>
+          <a:p>
+            <a:pPr marL="742950" lvl="1" indent="-285750">
+              <a:buFont typeface="Arial"/>
+              <a:buChar char="•"/>
+            </a:pPr>
+            <a:r>
+              <a:rPr lang="en-US" dirty="0"/>
+              <a:t>Upload </a:t>
+            </a:r>
+            <a:r>
+              <a:rPr lang="en-US" dirty="0" smtClean="0"/>
+              <a:t>Compiled </a:t>
+            </a:r>
+            <a:r>
+              <a:rPr lang="en-US" dirty="0"/>
+              <a:t>J</a:t>
+            </a:r>
+            <a:r>
+              <a:rPr lang="en-US" dirty="0" smtClean="0"/>
+              <a:t>ar from Hog Program</a:t>
+            </a:r>
+          </a:p>
+          <a:p>
+            <a:pPr marL="742950" lvl="1" indent="-285750">
+              <a:buFont typeface="Arial"/>
+              <a:buChar char="•"/>
+            </a:pPr>
+            <a:r>
+              <a:rPr lang="en-US" dirty="0" smtClean="0"/>
+              <a:t>Create Job Flow and Launch </a:t>
+            </a:r>
+            <a:r>
+              <a:rPr lang="en-US" dirty="0"/>
+              <a:t>EC2 Instances </a:t>
+            </a:r>
+            <a:endParaRPr lang="en-US" dirty="0" smtClean="0"/>
+          </a:p>
+          <a:p>
+            <a:pPr marL="742950" lvl="1" indent="-285750">
+              <a:buFont typeface="Arial"/>
+              <a:buChar char="•"/>
+            </a:pPr>
+            <a:r>
+              <a:rPr lang="en-US" dirty="0"/>
+              <a:t>Analyze </a:t>
+            </a:r>
+            <a:r>
+              <a:rPr lang="en-US" dirty="0" smtClean="0"/>
+              <a:t>Output Files</a:t>
+            </a:r>
+          </a:p>
+          <a:p>
+            <a:endParaRPr lang="en-US" sz="2200" dirty="0"/>
+          </a:p>
+        </p:txBody>
+      </p:sp>
+    </p:spTree>
+    <p:extLst>
+      <p:ext uri="{BB962C8B-B14F-4D97-AF65-F5344CB8AC3E}">
+        <p14:creationId xmlns:p14="http://schemas.microsoft.com/office/powerpoint/2010/main" val="4118404798"/>
+      </p:ext>
+    </p:extLst>
+  </p:cSld>
+  <p:clrMapOvr>
+    <a:masterClrMapping/>
+  </p:clrMapOvr>
+  <p:timing>
+    <p:tnLst>
+      <p:par>
+        <p:cTn xmlns:p14="http://schemas.microsoft.com/office/powerpoint/2010/main" id="1" dur="indefinite" restart="never" nodeType="tmRoot"/>
+      </p:par>
+    </p:tnLst>
+  </p:timing>
+</p:sld>
+</file>
+
+<file path=ppt/slides/slide24.xml><?xml version="1.0" encoding="utf-8"?>
+<p:sld xmlns:a="http://schemas.openxmlformats.org/drawingml/2006/main" xmlns:r="http://schemas.openxmlformats.org/officeDocument/2006/relationships" xmlns:p="http://schemas.openxmlformats.org/presentationml/2006/main">
+  <p:cSld>
+    <p:spTree>
+      <p:nvGrpSpPr>
+        <p:cNvPr id="1" name=""/>
+        <p:cNvGrpSpPr/>
+        <p:nvPr/>
+      </p:nvGrpSpPr>
+      <p:grpSpPr>
+        <a:xfrm>
+          <a:off x="0" y="0"/>
+          <a:ext cx="0" cy="0"/>
+          <a:chOff x="0" y="0"/>
+          <a:chExt cx="0" cy="0"/>
+        </a:xfrm>
+      </p:grpSpPr>
+      <p:sp>
+        <p:nvSpPr>
+          <p:cNvPr id="2" name="Title 1"/>
+          <p:cNvSpPr>
+            <a:spLocks noGrp="1"/>
+          </p:cNvSpPr>
+          <p:nvPr>
+            <p:ph type="title"/>
+          </p:nvPr>
+        </p:nvSpPr>
+        <p:spPr/>
+        <p:txBody>
+          <a:bodyPr/>
+          <a:lstStyle/>
+          <a:p>
+            <a:r>
+              <a:rPr lang="en-US" sz="9600" dirty="0" smtClean="0"/>
+              <a:t>demo</a:t>
+            </a:r>
+            <a:endParaRPr lang="en-US" sz="9600" dirty="0"/>
+          </a:p>
+        </p:txBody>
+      </p:sp>
+      <p:sp>
+        <p:nvSpPr>
+          <p:cNvPr id="3" name="Text Placeholder 2"/>
+          <p:cNvSpPr>
+            <a:spLocks noGrp="1"/>
+          </p:cNvSpPr>
+          <p:nvPr>
+            <p:ph type="body" idx="1"/>
+          </p:nvPr>
+        </p:nvSpPr>
+        <p:spPr/>
+        <p:txBody>
+          <a:bodyPr/>
+          <a:lstStyle/>
+          <a:p>
+            <a:endParaRPr lang="en-US"/>
+          </a:p>
+        </p:txBody>
+      </p:sp>
+    </p:spTree>
+    <p:extLst>
+      <p:ext uri="{BB962C8B-B14F-4D97-AF65-F5344CB8AC3E}">
+        <p14:creationId xmlns:p14="http://schemas.microsoft.com/office/powerpoint/2010/main" val="921940227"/>
+      </p:ext>
+    </p:extLst>
+  </p:cSld>
+  <p:clrMapOvr>
+    <a:masterClrMapping/>
+  </p:clrMapOvr>
+  <p:timing>
+    <p:tnLst>
+      <p:par>
+        <p:cTn xmlns:p14="http://schemas.microsoft.com/office/powerpoint/2010/main" id="1" dur="indefinite" restart="never" nodeType="tmRoot"/>
+      </p:par>
+    </p:tnLst>
+  </p:timing>
+</p:sld>
+</file>
+
+<file path=ppt/slides/slide25.xml><?xml version="1.0" encoding="utf-8"?>
+<p:sld xmlns:a="http://schemas.openxmlformats.org/drawingml/2006/main" xmlns:r="http://schemas.openxmlformats.org/officeDocument/2006/relationships" xmlns:p="http://schemas.openxmlformats.org/presentationml/2006/main">
+  <p:cSld>
+    <p:spTree>
+      <p:nvGrpSpPr>
+        <p:cNvPr id="1" name=""/>
+        <p:cNvGrpSpPr/>
+        <p:nvPr/>
+      </p:nvGrpSpPr>
+      <p:grpSpPr>
+        <a:xfrm>
+          <a:off x="0" y="0"/>
+          <a:ext cx="0" cy="0"/>
+          <a:chOff x="0" y="0"/>
+          <a:chExt cx="0" cy="0"/>
+        </a:xfrm>
+      </p:grpSpPr>
+      <p:sp>
+        <p:nvSpPr>
+          <p:cNvPr id="2" name="Title 1"/>
+          <p:cNvSpPr>
+            <a:spLocks noGrp="1"/>
+          </p:cNvSpPr>
+          <p:nvPr>
+            <p:ph type="title"/>
+          </p:nvPr>
+        </p:nvSpPr>
+        <p:spPr>
+          <a:xfrm rot="19140000">
+            <a:off x="631242" y="1776157"/>
+            <a:ext cx="5650992" cy="1207509"/>
+          </a:xfrm>
+        </p:spPr>
+        <p:txBody>
+          <a:bodyPr/>
+          <a:lstStyle/>
+          <a:p>
+            <a:r>
+              <a:rPr lang="en-US" sz="6000" dirty="0" smtClean="0"/>
+              <a:t>conclusions</a:t>
+            </a:r>
+            <a:endParaRPr lang="en-US" sz="6000" dirty="0"/>
+          </a:p>
+        </p:txBody>
+      </p:sp>
+      <p:sp>
+        <p:nvSpPr>
+          <p:cNvPr id="3" name="Text Placeholder 2"/>
+          <p:cNvSpPr>
+            <a:spLocks noGrp="1"/>
+          </p:cNvSpPr>
+          <p:nvPr>
+            <p:ph type="body" idx="1"/>
+          </p:nvPr>
+        </p:nvSpPr>
+        <p:spPr>
+          <a:xfrm rot="19140000">
+            <a:off x="938448" y="2278221"/>
+            <a:ext cx="7240656" cy="329184"/>
+          </a:xfrm>
+        </p:spPr>
+        <p:txBody>
+          <a:bodyPr>
+            <a:noAutofit/>
+          </a:bodyPr>
+          <a:lstStyle/>
+          <a:p>
+            <a:r>
+              <a:rPr lang="en-US" sz="2400" spc="0" dirty="0" smtClean="0"/>
+              <a:t>The hog team</a:t>
+            </a:r>
+            <a:endParaRPr lang="en-US" sz="2400" spc="0" dirty="0"/>
+          </a:p>
+        </p:txBody>
+      </p:sp>
+    </p:spTree>
+    <p:extLst>
+      <p:ext uri="{BB962C8B-B14F-4D97-AF65-F5344CB8AC3E}">
+        <p14:creationId xmlns:p14="http://schemas.microsoft.com/office/powerpoint/2010/main" val="3601372676"/>
+      </p:ext>
+    </p:extLst>
+  </p:cSld>
+  <p:clrMapOvr>
+    <a:masterClrMapping/>
+  </p:clrMapOvr>
+  <p:timing>
+    <p:tnLst>
+      <p:par>
+        <p:cTn xmlns:p14="http://schemas.microsoft.com/office/powerpoint/2010/main" id="1" dur="indefinite" restart="never" nodeType="tmRoot"/>
+      </p:par>
+    </p:tnLst>
+  </p:timing>
+</p:sld>
+</file>
+
+<file path=ppt/slides/slide26.xml><?xml version="1.0" encoding="utf-8"?>
+<p:sld xmlns:a="http://schemas.openxmlformats.org/drawingml/2006/main" xmlns:r="http://schemas.openxmlformats.org/officeDocument/2006/relationships" xmlns:p="http://schemas.openxmlformats.org/presentationml/2006/main">
+  <p:cSld>
+    <p:spTree>
+      <p:nvGrpSpPr>
+        <p:cNvPr id="1" name=""/>
+        <p:cNvGrpSpPr/>
+        <p:nvPr/>
+      </p:nvGrpSpPr>
+      <p:grpSpPr>
+        <a:xfrm>
+          <a:off x="0" y="0"/>
+          <a:ext cx="0" cy="0"/>
+          <a:chOff x="0" y="0"/>
+          <a:chExt cx="0" cy="0"/>
+        </a:xfrm>
+      </p:grpSpPr>
+      <p:sp>
+        <p:nvSpPr>
           <p:cNvPr id="2" name="Title 1"/>
           <p:cNvSpPr>
             <a:spLocks noGrp="1"/>
@@ -12544,7 +14263,7 @@
 </p:sld>
 </file>
 
-<file path=ppt/slides/slide23.xml><?xml version="1.0" encoding="utf-8"?>
+<file path=ppt/slides/slide27.xml><?xml version="1.0" encoding="utf-8"?>
 <p:sld xmlns:a="http://schemas.openxmlformats.org/drawingml/2006/main" xmlns:r="http://schemas.openxmlformats.org/officeDocument/2006/relationships" xmlns:p="http://schemas.openxmlformats.org/presentationml/2006/main">
   <p:cSld>
     <p:spTree>
@@ -12670,6 +14389,298 @@
 </p:sld>
 </file>
 
+<file path=ppt/slides/slide28.xml><?xml version="1.0" encoding="utf-8"?>
+<p:sld xmlns:a="http://schemas.openxmlformats.org/drawingml/2006/main" xmlns:r="http://schemas.openxmlformats.org/officeDocument/2006/relationships" xmlns:p="http://schemas.openxmlformats.org/presentationml/2006/main">
+  <p:cSld>
+    <p:spTree>
+      <p:nvGrpSpPr>
+        <p:cNvPr id="1" name=""/>
+        <p:cNvGrpSpPr/>
+        <p:nvPr/>
+      </p:nvGrpSpPr>
+      <p:grpSpPr>
+        <a:xfrm>
+          <a:off x="0" y="0"/>
+          <a:ext cx="0" cy="0"/>
+          <a:chOff x="0" y="0"/>
+          <a:chExt cx="0" cy="0"/>
+        </a:xfrm>
+      </p:grpSpPr>
+      <p:sp>
+        <p:nvSpPr>
+          <p:cNvPr id="2" name="Title 1"/>
+          <p:cNvSpPr>
+            <a:spLocks noGrp="1"/>
+          </p:cNvSpPr>
+          <p:nvPr>
+            <p:ph type="title"/>
+          </p:nvPr>
+        </p:nvSpPr>
+        <p:spPr>
+          <a:xfrm>
+            <a:off x="747358" y="368683"/>
+            <a:ext cx="7520940" cy="548640"/>
+          </a:xfrm>
+        </p:spPr>
+        <p:txBody>
+          <a:bodyPr>
+            <a:normAutofit/>
+          </a:bodyPr>
+          <a:lstStyle/>
+          <a:p>
+            <a:r>
+              <a:rPr lang="en-US" dirty="0" smtClean="0"/>
+              <a:t>Hadoop Architecture</a:t>
+            </a:r>
+            <a:endParaRPr lang="en-US" dirty="0"/>
+          </a:p>
+        </p:txBody>
+      </p:sp>
+      <p:sp>
+        <p:nvSpPr>
+          <p:cNvPr id="3" name="Content Placeholder 2"/>
+          <p:cNvSpPr>
+            <a:spLocks noGrp="1"/>
+          </p:cNvSpPr>
+          <p:nvPr>
+            <p:ph idx="1"/>
+          </p:nvPr>
+        </p:nvSpPr>
+        <p:spPr/>
+        <p:txBody>
+          <a:bodyPr>
+            <a:normAutofit/>
+          </a:bodyPr>
+          <a:lstStyle/>
+          <a:p>
+            <a:pPr>
+              <a:buFont typeface="Arial"/>
+              <a:buChar char="•"/>
+            </a:pPr>
+            <a:r>
+              <a:rPr lang="en-US" sz="2400" dirty="0" smtClean="0"/>
+              <a:t>A small Hadoop cluster will include a single master and multiple worker nodes. </a:t>
+            </a:r>
+          </a:p>
+          <a:p>
+            <a:pPr>
+              <a:buFont typeface="Arial"/>
+              <a:buChar char="•"/>
+            </a:pPr>
+            <a:r>
+              <a:rPr lang="en-US" sz="2400" dirty="0" smtClean="0"/>
+              <a:t>Master Node – JobTracker, TaskTracker, NameNode, and DataNode</a:t>
+            </a:r>
+          </a:p>
+          <a:p>
+            <a:pPr>
+              <a:buFont typeface="Arial"/>
+              <a:buChar char="•"/>
+            </a:pPr>
+            <a:r>
+              <a:rPr lang="en-US" sz="2400" dirty="0" smtClean="0"/>
+              <a:t>DataNode – Sends blocks of data over the network using TCP/IP layer for communication; clients use RPC to communicate between each other. </a:t>
+            </a:r>
+          </a:p>
+          <a:p>
+            <a:pPr>
+              <a:buFont typeface="Arial"/>
+              <a:buChar char="•"/>
+            </a:pPr>
+            <a:r>
+              <a:rPr lang="en-US" sz="2400" dirty="0" smtClean="0"/>
+              <a:t>JobTracker – Sends MapReduce tasks to nodes</a:t>
+            </a:r>
+          </a:p>
+          <a:p>
+            <a:pPr>
+              <a:buFont typeface="Arial"/>
+              <a:buChar char="•"/>
+            </a:pPr>
+            <a:endParaRPr lang="en-US" sz="2400" dirty="0"/>
+          </a:p>
+          <a:p>
+            <a:pPr>
+              <a:buFont typeface="Arial"/>
+              <a:buChar char="•"/>
+            </a:pPr>
+            <a:endParaRPr lang="en-US" sz="2400" b="0" dirty="0" smtClean="0"/>
+          </a:p>
+          <a:p>
+            <a:pPr>
+              <a:buFont typeface="Arial"/>
+              <a:buChar char="•"/>
+            </a:pPr>
+            <a:endParaRPr lang="en-US" sz="2400" dirty="0"/>
+          </a:p>
+        </p:txBody>
+      </p:sp>
+    </p:spTree>
+    <p:extLst>
+      <p:ext uri="{BB962C8B-B14F-4D97-AF65-F5344CB8AC3E}">
+        <p14:creationId xmlns:p14="http://schemas.microsoft.com/office/powerpoint/2010/main" val="2237843696"/>
+      </p:ext>
+    </p:extLst>
+  </p:cSld>
+  <p:clrMapOvr>
+    <a:masterClrMapping/>
+  </p:clrMapOvr>
+  <p:timing>
+    <p:tnLst>
+      <p:par>
+        <p:cTn xmlns:p14="http://schemas.microsoft.com/office/powerpoint/2010/main" id="1" dur="indefinite" restart="never" nodeType="tmRoot"/>
+      </p:par>
+    </p:tnLst>
+  </p:timing>
+</p:sld>
+</file>
+
+<file path=ppt/slides/slide29.xml><?xml version="1.0" encoding="utf-8"?>
+<p:sld xmlns:a="http://schemas.openxmlformats.org/drawingml/2006/main" xmlns:r="http://schemas.openxmlformats.org/officeDocument/2006/relationships" xmlns:p="http://schemas.openxmlformats.org/presentationml/2006/main">
+  <p:cSld>
+    <p:spTree>
+      <p:nvGrpSpPr>
+        <p:cNvPr id="1" name=""/>
+        <p:cNvGrpSpPr/>
+        <p:nvPr/>
+      </p:nvGrpSpPr>
+      <p:grpSpPr>
+        <a:xfrm>
+          <a:off x="0" y="0"/>
+          <a:ext cx="0" cy="0"/>
+          <a:chOff x="0" y="0"/>
+          <a:chExt cx="0" cy="0"/>
+        </a:xfrm>
+      </p:grpSpPr>
+      <p:sp>
+        <p:nvSpPr>
+          <p:cNvPr id="2" name="Title 1"/>
+          <p:cNvSpPr>
+            <a:spLocks noGrp="1"/>
+          </p:cNvSpPr>
+          <p:nvPr>
+            <p:ph type="title"/>
+          </p:nvPr>
+        </p:nvSpPr>
+        <p:spPr>
+          <a:xfrm>
+            <a:off x="747358" y="368683"/>
+            <a:ext cx="7520940" cy="548640"/>
+          </a:xfrm>
+        </p:spPr>
+        <p:txBody>
+          <a:bodyPr>
+            <a:normAutofit/>
+          </a:bodyPr>
+          <a:lstStyle/>
+          <a:p>
+            <a:r>
+              <a:rPr lang="en-US" dirty="0" smtClean="0"/>
+              <a:t>Hadoop Architecture (Continued)</a:t>
+            </a:r>
+            <a:endParaRPr lang="en-US" dirty="0"/>
+          </a:p>
+        </p:txBody>
+      </p:sp>
+      <p:sp>
+        <p:nvSpPr>
+          <p:cNvPr id="3" name="Content Placeholder 2"/>
+          <p:cNvSpPr>
+            <a:spLocks noGrp="1"/>
+          </p:cNvSpPr>
+          <p:nvPr>
+            <p:ph idx="1"/>
+          </p:nvPr>
+        </p:nvSpPr>
+        <p:spPr/>
+        <p:txBody>
+          <a:bodyPr>
+            <a:normAutofit/>
+          </a:bodyPr>
+          <a:lstStyle/>
+          <a:p>
+            <a:pPr>
+              <a:buFont typeface="Arial"/>
+              <a:buChar char="•"/>
+            </a:pPr>
+            <a:r>
+              <a:rPr lang="en-US" sz="2400" dirty="0" smtClean="0"/>
+              <a:t>NameNode – Keeps the directory tree of all files in the file system, and trackers where  file data is kept.</a:t>
+            </a:r>
+          </a:p>
+          <a:p>
+            <a:pPr>
+              <a:buFont typeface="Arial"/>
+              <a:buChar char="•"/>
+            </a:pPr>
+            <a:r>
+              <a:rPr lang="en-US" sz="2400" dirty="0" smtClean="0"/>
+              <a:t>TaskTracker– A node in the cluster that accepts tasks.</a:t>
+            </a:r>
+          </a:p>
+          <a:p>
+            <a:pPr lvl="2">
+              <a:buFont typeface="Arial"/>
+              <a:buChar char="•"/>
+            </a:pPr>
+            <a:r>
+              <a:rPr lang="en-US" sz="2400" dirty="0" smtClean="0"/>
+              <a:t>The TaskTracker spawns separate JVM processes to do work to ensure process failure does not take down the task tracker.</a:t>
+            </a:r>
+          </a:p>
+          <a:p>
+            <a:pPr lvl="2">
+              <a:buFont typeface="Arial"/>
+              <a:buChar char="•"/>
+            </a:pPr>
+            <a:r>
+              <a:rPr lang="en-US" sz="2400" dirty="0" smtClean="0"/>
+              <a:t>When the process finishes, successfully or not, the tracker notifies the JobTracker.</a:t>
+            </a:r>
+          </a:p>
+          <a:p>
+            <a:pPr>
+              <a:buFont typeface="Arial"/>
+              <a:buChar char="•"/>
+            </a:pPr>
+            <a:endParaRPr lang="en-US" sz="2400" dirty="0"/>
+          </a:p>
+          <a:p>
+            <a:pPr>
+              <a:buFont typeface="Arial"/>
+              <a:buChar char="•"/>
+            </a:pPr>
+            <a:endParaRPr lang="en-US" sz="2400" b="0" dirty="0" smtClean="0"/>
+          </a:p>
+          <a:p>
+            <a:pPr>
+              <a:buFont typeface="Arial"/>
+              <a:buChar char="•"/>
+            </a:pPr>
+            <a:endParaRPr lang="en-US" sz="2400" dirty="0"/>
+          </a:p>
+        </p:txBody>
+      </p:sp>
+    </p:spTree>
+    <p:extLst>
+      <p:ext uri="{BB962C8B-B14F-4D97-AF65-F5344CB8AC3E}">
+        <p14:creationId xmlns:p14="http://schemas.microsoft.com/office/powerpoint/2010/main" val="2359677548"/>
+      </p:ext>
+    </p:extLst>
+  </p:cSld>
+  <p:clrMapOvr>
+    <a:masterClrMapping/>
+  </p:clrMapOvr>
+  <p:timing>
+    <p:tnLst>
+      <p:par>
+        <p:cTn xmlns:p14="http://schemas.microsoft.com/office/powerpoint/2010/main" id="1" dur="indefinite" restart="never" nodeType="tmRoot"/>
+      </p:par>
+    </p:tnLst>
+  </p:timing>
+</p:sld>
+</file>
+
 <file path=ppt/slides/slide3.xml><?xml version="1.0" encoding="utf-8"?>
 <p:sld xmlns:a="http://schemas.openxmlformats.org/drawingml/2006/main" xmlns:r="http://schemas.openxmlformats.org/officeDocument/2006/relationships" xmlns:p="http://schemas.openxmlformats.org/presentationml/2006/main">
   <p:cSld>
@@ -12749,6 +14760,148 @@
     <p:extLst>
       <p:ext uri="{BB962C8B-B14F-4D97-AF65-F5344CB8AC3E}">
         <p14:creationId xmlns:p14="http://schemas.microsoft.com/office/powerpoint/2010/main" val="4041799400"/>
+      </p:ext>
+    </p:extLst>
+  </p:cSld>
+  <p:clrMapOvr>
+    <a:masterClrMapping/>
+  </p:clrMapOvr>
+  <p:timing>
+    <p:tnLst>
+      <p:par>
+        <p:cTn xmlns:p14="http://schemas.microsoft.com/office/powerpoint/2010/main" id="1" dur="indefinite" restart="never" nodeType="tmRoot"/>
+      </p:par>
+    </p:tnLst>
+  </p:timing>
+</p:sld>
+</file>
+
+<file path=ppt/slides/slide30.xml><?xml version="1.0" encoding="utf-8"?>
+<p:sld xmlns:a="http://schemas.openxmlformats.org/drawingml/2006/main" xmlns:r="http://schemas.openxmlformats.org/officeDocument/2006/relationships" xmlns:p="http://schemas.openxmlformats.org/presentationml/2006/main">
+  <p:cSld>
+    <p:spTree>
+      <p:nvGrpSpPr>
+        <p:cNvPr id="1" name=""/>
+        <p:cNvGrpSpPr/>
+        <p:nvPr/>
+      </p:nvGrpSpPr>
+      <p:grpSpPr>
+        <a:xfrm>
+          <a:off x="0" y="0"/>
+          <a:ext cx="0" cy="0"/>
+          <a:chOff x="0" y="0"/>
+          <a:chExt cx="0" cy="0"/>
+        </a:xfrm>
+      </p:grpSpPr>
+      <p:sp>
+        <p:nvSpPr>
+          <p:cNvPr id="2" name="Title 1"/>
+          <p:cNvSpPr>
+            <a:spLocks noGrp="1"/>
+          </p:cNvSpPr>
+          <p:nvPr>
+            <p:ph type="title"/>
+          </p:nvPr>
+        </p:nvSpPr>
+        <p:spPr>
+          <a:xfrm>
+            <a:off x="747358" y="368683"/>
+            <a:ext cx="7520940" cy="548640"/>
+          </a:xfrm>
+        </p:spPr>
+        <p:txBody>
+          <a:bodyPr>
+            <a:normAutofit/>
+          </a:bodyPr>
+          <a:lstStyle/>
+          <a:p>
+            <a:r>
+              <a:rPr lang="en-US" dirty="0" smtClean="0"/>
+              <a:t>Performance Benefits</a:t>
+            </a:r>
+            <a:endParaRPr lang="en-US" dirty="0"/>
+          </a:p>
+        </p:txBody>
+      </p:sp>
+      <p:sp>
+        <p:nvSpPr>
+          <p:cNvPr id="3" name="Content Placeholder 2"/>
+          <p:cNvSpPr>
+            <a:spLocks noGrp="1"/>
+          </p:cNvSpPr>
+          <p:nvPr>
+            <p:ph idx="1"/>
+          </p:nvPr>
+        </p:nvSpPr>
+        <p:spPr/>
+        <p:txBody>
+          <a:bodyPr>
+            <a:normAutofit/>
+          </a:bodyPr>
+          <a:lstStyle/>
+          <a:p>
+            <a:pPr>
+              <a:buFont typeface="Arial"/>
+              <a:buChar char="•"/>
+            </a:pPr>
+            <a:r>
+              <a:rPr lang="en-US" sz="2400" dirty="0" smtClean="0"/>
+              <a:t>Improves CPU Utilization</a:t>
+            </a:r>
+          </a:p>
+          <a:p>
+            <a:pPr>
+              <a:buFont typeface="Arial"/>
+              <a:buChar char="•"/>
+            </a:pPr>
+            <a:r>
+              <a:rPr lang="en-US" sz="2400" dirty="0" smtClean="0"/>
+              <a:t>Node Failure Recovery</a:t>
+            </a:r>
+          </a:p>
+          <a:p>
+            <a:pPr>
+              <a:buFont typeface="Arial"/>
+              <a:buChar char="•"/>
+            </a:pPr>
+            <a:r>
+              <a:rPr lang="en-US" sz="2400" dirty="0" smtClean="0"/>
+              <a:t>Data Awareness</a:t>
+            </a:r>
+          </a:p>
+          <a:p>
+            <a:pPr>
+              <a:buFont typeface="Arial"/>
+              <a:buChar char="•"/>
+            </a:pPr>
+            <a:r>
+              <a:rPr lang="en-US" sz="2400" dirty="0" smtClean="0"/>
+              <a:t>Portability</a:t>
+            </a:r>
+          </a:p>
+          <a:p>
+            <a:pPr>
+              <a:buFont typeface="Arial"/>
+              <a:buChar char="•"/>
+            </a:pPr>
+            <a:r>
+              <a:rPr lang="en-US" sz="2400" dirty="0" smtClean="0"/>
+              <a:t>Six Scheduling Priorities</a:t>
+            </a:r>
+          </a:p>
+          <a:p>
+            <a:pPr>
+              <a:buFont typeface="Arial"/>
+              <a:buChar char="•"/>
+            </a:pPr>
+            <a:endParaRPr lang="en-US" sz="2400" dirty="0"/>
+          </a:p>
+        </p:txBody>
+      </p:sp>
+    </p:spTree>
+    <p:extLst>
+      <p:ext uri="{BB962C8B-B14F-4D97-AF65-F5344CB8AC3E}">
+        <p14:creationId xmlns:p14="http://schemas.microsoft.com/office/powerpoint/2010/main" val="3068858484"/>
       </p:ext>
     </p:extLst>
   </p:cSld>
@@ -12824,11 +14977,7 @@
           <a:p>
             <a:r>
               <a:rPr lang="en-US" sz="2400" b="1" cap="none" spc="0" dirty="0" smtClean="0"/>
-              <a:t>Say </a:t>
-            </a:r>
-            <a:r>
-              <a:rPr lang="en-US" sz="2400" b="1" cap="none" spc="0" dirty="0" smtClean="0"/>
-              <a:t>you’re…</a:t>
+              <a:t>Say you’re…</a:t>
             </a:r>
             <a:endParaRPr lang="en-US" sz="2400" b="1" cap="none" spc="0" dirty="0"/>
           </a:p>
@@ -12857,13 +15006,8 @@
             </a:pPr>
             <a:r>
               <a:rPr lang="en-US" dirty="0" smtClean="0"/>
-              <a:t>a corporation</a:t>
-            </a:r>
-            <a:r>
-              <a:rPr lang="en-US" dirty="0" smtClean="0"/>
-              <a:t>,</a:t>
-            </a:r>
-            <a:endParaRPr lang="en-US" dirty="0" smtClean="0"/>
+              <a:t>a corporation,</a:t>
+            </a:r>
           </a:p>
           <a:p>
             <a:pPr>
@@ -12878,7 +15022,6 @@
               <a:rPr lang="en-US" dirty="0" smtClean="0"/>
               <a:t>ith data from your mail server,</a:t>
             </a:r>
-            <a:endParaRPr lang="en-US" dirty="0" smtClean="0"/>
           </a:p>
           <a:p>
             <a:pPr>
@@ -12887,11 +15030,7 @@
             </a:pPr>
             <a:r>
               <a:rPr lang="en-US" dirty="0" smtClean="0"/>
-              <a:t>and </a:t>
-            </a:r>
-            <a:r>
-              <a:rPr lang="en-US" dirty="0" smtClean="0"/>
-              <a:t>you want to find out the average amount of time a client waits for a response…</a:t>
+              <a:t>and you want to find out the average amount of time a client waits for a response…</a:t>
             </a:r>
             <a:endParaRPr lang="en-US" dirty="0"/>
           </a:p>
@@ -15432,11 +17571,7 @@
           <a:p>
             <a:r>
               <a:rPr lang="en-US" dirty="0" smtClean="0"/>
-              <a:t>The simplest </a:t>
-            </a:r>
-            <a:r>
-              <a:rPr lang="en-US" dirty="0" smtClean="0"/>
-              <a:t>distributed sort</a:t>
+              <a:t>The simplest distributed sort</a:t>
             </a:r>
             <a:endParaRPr lang="en-US" dirty="0"/>
           </a:p>
@@ -15480,19 +17615,7 @@
             </a:pPr>
             <a:r>
               <a:rPr lang="en-US" dirty="0" smtClean="0"/>
-              <a:t>Read in </a:t>
-            </a:r>
-            <a:r>
-              <a:rPr lang="en-US" dirty="0" smtClean="0"/>
-              <a:t>giga</a:t>
-            </a:r>
-            <a:r>
-              <a:rPr lang="en-US" dirty="0" smtClean="0"/>
-              <a:t>bytes </a:t>
-            </a:r>
-            <a:r>
-              <a:rPr lang="en-US" dirty="0" smtClean="0"/>
-              <a:t>of data formatted as,</a:t>
+              <a:t>Read in gigabytes of data formatted as,</a:t>
             </a:r>
           </a:p>
           <a:p>
@@ -15529,15 +17652,7 @@
             </a:pPr>
             <a:r>
               <a:rPr lang="en-US" dirty="0" smtClean="0"/>
-              <a:t>Synchronize computation </a:t>
-            </a:r>
-            <a:r>
-              <a:rPr lang="en-US" dirty="0" smtClean="0"/>
-              <a:t>across multiple machines </a:t>
-            </a:r>
-            <a:r>
-              <a:rPr lang="en-US" dirty="0" smtClean="0"/>
-              <a:t>to sort and remove duplicate numbers,</a:t>
+              <a:t>Synchronize computation across multiple machines to sort and remove duplicate numbers,</a:t>
             </a:r>
           </a:p>
           <a:p>

</xml_diff>